<commit_message>
Exercício de Técnicas de Programação e Projeto do TCC
</commit_message>
<xml_diff>
--- a/tcc/enche-o-tanque/Enche o Tanque.pptx
+++ b/tcc/enche-o-tanque/Enche o Tanque.pptx
@@ -5,7 +5,7 @@
     <p:sldMasterId id="2147483648" r:id="rId1"/>
   </p:sldMasterIdLst>
   <p:handoutMasterIdLst>
-    <p:handoutMasterId r:id="rId13"/>
+    <p:handoutMasterId r:id="rId11"/>
   </p:handoutMasterIdLst>
   <p:sldIdLst>
     <p:sldId id="262" r:id="rId2"/>
@@ -13,12 +13,10 @@
     <p:sldId id="267" r:id="rId4"/>
     <p:sldId id="266" r:id="rId5"/>
     <p:sldId id="270" r:id="rId6"/>
-    <p:sldId id="273" r:id="rId7"/>
-    <p:sldId id="264" r:id="rId8"/>
-    <p:sldId id="274" r:id="rId9"/>
-    <p:sldId id="269" r:id="rId10"/>
-    <p:sldId id="272" r:id="rId11"/>
-    <p:sldId id="275" r:id="rId12"/>
+    <p:sldId id="264" r:id="rId7"/>
+    <p:sldId id="273" r:id="rId8"/>
+    <p:sldId id="272" r:id="rId9"/>
+    <p:sldId id="275" r:id="rId10"/>
   </p:sldIdLst>
   <p:sldSz cx="9144000" cy="6858000" type="screen4x3"/>
   <p:notesSz cx="6858000" cy="9144000"/>
@@ -221,7 +219,7 @@
           <a:p>
             <a:fld id="{957E3F99-D12F-4954-A61D-F49FB68D10A3}" type="datetimeFigureOut">
               <a:rPr lang="pt-BR" smtClean="0"/>
-              <a:t>18/06/2019</a:t>
+              <a:t>27/11/2019</a:t>
             </a:fld>
             <a:endParaRPr lang="pt-BR"/>
           </a:p>
@@ -338,7 +336,7 @@
           <a:p>
             <a:fld id="{2E60D82F-4EDC-49F1-9B28-C237C8B75C57}" type="datetimeFigureOut">
               <a:rPr lang="pt-BR" smtClean="0"/>
-              <a:t>18/06/2019</a:t>
+              <a:t>27/11/2019</a:t>
             </a:fld>
             <a:endParaRPr lang="pt-BR"/>
           </a:p>
@@ -504,7 +502,7 @@
           <a:p>
             <a:fld id="{2E60D82F-4EDC-49F1-9B28-C237C8B75C57}" type="datetimeFigureOut">
               <a:rPr lang="pt-BR" smtClean="0"/>
-              <a:t>18/06/2019</a:t>
+              <a:t>27/11/2019</a:t>
             </a:fld>
             <a:endParaRPr lang="pt-BR"/>
           </a:p>
@@ -635,7 +633,7 @@
           <a:p>
             <a:fld id="{2E60D82F-4EDC-49F1-9B28-C237C8B75C57}" type="datetimeFigureOut">
               <a:rPr lang="pt-BR" smtClean="0"/>
-              <a:t>18/06/2019</a:t>
+              <a:t>27/11/2019</a:t>
             </a:fld>
             <a:endParaRPr lang="pt-BR"/>
           </a:p>
@@ -828,7 +826,7 @@
           <a:p>
             <a:fld id="{2E60D82F-4EDC-49F1-9B28-C237C8B75C57}" type="datetimeFigureOut">
               <a:rPr lang="pt-BR" smtClean="0"/>
-              <a:t>18/06/2019</a:t>
+              <a:t>27/11/2019</a:t>
             </a:fld>
             <a:endParaRPr lang="pt-BR"/>
           </a:p>
@@ -1075,7 +1073,7 @@
           <a:p>
             <a:fld id="{2E60D82F-4EDC-49F1-9B28-C237C8B75C57}" type="datetimeFigureOut">
               <a:rPr lang="pt-BR" smtClean="0"/>
-              <a:t>18/06/2019</a:t>
+              <a:t>27/11/2019</a:t>
             </a:fld>
             <a:endParaRPr lang="pt-BR"/>
           </a:p>
@@ -1651,570 +1649,6 @@
 </p:sld>
 </file>
 
-<file path=ppt/slides/slide10.xml><?xml version="1.0" encoding="utf-8"?>
-<p:sld xmlns:a="http://schemas.openxmlformats.org/drawingml/2006/main" xmlns:r="http://schemas.openxmlformats.org/officeDocument/2006/relationships" xmlns:p="http://schemas.openxmlformats.org/presentationml/2006/main">
-  <p:cSld>
-    <p:spTree>
-      <p:nvGrpSpPr>
-        <p:cNvPr id="1" name=""/>
-        <p:cNvGrpSpPr/>
-        <p:nvPr/>
-      </p:nvGrpSpPr>
-      <p:grpSpPr>
-        <a:xfrm>
-          <a:off x="0" y="0"/>
-          <a:ext cx="0" cy="0"/>
-          <a:chOff x="0" y="0"/>
-          <a:chExt cx="0" cy="0"/>
-        </a:xfrm>
-      </p:grpSpPr>
-      <p:sp>
-        <p:nvSpPr>
-          <p:cNvPr id="2" name="Título 1"/>
-          <p:cNvSpPr>
-            <a:spLocks noGrp="1"/>
-          </p:cNvSpPr>
-          <p:nvPr>
-            <p:ph type="title"/>
-          </p:nvPr>
-        </p:nvSpPr>
-        <p:spPr>
-          <a:xfrm>
-            <a:off x="462401" y="3140968"/>
-            <a:ext cx="8229600" cy="1143000"/>
-          </a:xfrm>
-        </p:spPr>
-        <p:txBody>
-          <a:bodyPr>
-            <a:normAutofit fontScale="90000"/>
-          </a:bodyPr>
-          <a:lstStyle/>
-          <a:p>
-            <a:r>
-              <a:rPr lang="pt-BR" sz="1800" dirty="0" err="1" smtClean="0">
-                <a:hlinkClick r:id="rId2"/>
-              </a:rPr>
-              <a:t>AutomotiveBusiness</a:t>
-            </a:r>
-            <a:r>
-              <a:rPr lang="pt-BR" sz="1800" dirty="0" smtClean="0">
-                <a:hlinkClick r:id="rId2"/>
-              </a:rPr>
-              <a:t> - Investimentos em publicidade</a:t>
-            </a:r>
-            <a:r>
-              <a:rPr lang="pt-BR" sz="1800" dirty="0" smtClean="0"/>
-              <a:t/>
-            </a:r>
-            <a:br>
-              <a:rPr lang="pt-BR" sz="1800" dirty="0" smtClean="0"/>
-            </a:br>
-            <a:r>
-              <a:rPr lang="pt-BR" sz="1800" dirty="0"/>
-              <a:t/>
-            </a:r>
-            <a:br>
-              <a:rPr lang="pt-BR" sz="1800" dirty="0"/>
-            </a:br>
-            <a:r>
-              <a:rPr lang="pt-BR" sz="1800" dirty="0" err="1" smtClean="0">
-                <a:hlinkClick r:id="rId3"/>
-              </a:rPr>
-              <a:t>AutomotiveBusiness</a:t>
-            </a:r>
-            <a:r>
-              <a:rPr lang="pt-BR" sz="1800" dirty="0" smtClean="0">
-                <a:hlinkClick r:id="rId3"/>
-              </a:rPr>
-              <a:t> - Empresa que mais investe em publicidade</a:t>
-            </a:r>
-            <a:r>
-              <a:rPr lang="pt-BR" sz="1800" dirty="0" smtClean="0"/>
-              <a:t/>
-            </a:r>
-            <a:br>
-              <a:rPr lang="pt-BR" sz="1800" dirty="0" smtClean="0"/>
-            </a:br>
-            <a:r>
-              <a:rPr lang="pt-BR" sz="1800" dirty="0"/>
-              <a:t/>
-            </a:r>
-            <a:br>
-              <a:rPr lang="pt-BR" sz="1800" dirty="0"/>
-            </a:br>
-            <a:r>
-              <a:rPr lang="pt-BR" sz="1800" dirty="0" err="1" smtClean="0">
-                <a:hlinkClick r:id="rId4"/>
-              </a:rPr>
-              <a:t>AltGrupo</a:t>
-            </a:r>
-            <a:r>
-              <a:rPr lang="pt-BR" sz="1800" dirty="0" smtClean="0">
-                <a:hlinkClick r:id="rId4"/>
-              </a:rPr>
-              <a:t> - Mercado automotivo dados/</a:t>
-            </a:r>
-            <a:r>
-              <a:rPr lang="pt-BR" sz="1800" dirty="0" smtClean="0"/>
-              <a:t/>
-            </a:r>
-            <a:br>
-              <a:rPr lang="pt-BR" sz="1800" dirty="0" smtClean="0"/>
-            </a:br>
-            <a:r>
-              <a:rPr lang="pt-BR" sz="1800" dirty="0"/>
-              <a:t/>
-            </a:r>
-            <a:br>
-              <a:rPr lang="pt-BR" sz="1800" dirty="0"/>
-            </a:br>
-            <a:r>
-              <a:rPr lang="pt-BR" sz="1800" dirty="0" err="1" smtClean="0">
-                <a:hlinkClick r:id="rId5"/>
-              </a:rPr>
-              <a:t>Estadao</a:t>
-            </a:r>
-            <a:r>
-              <a:rPr lang="pt-BR" sz="1800" dirty="0" smtClean="0">
-                <a:hlinkClick r:id="rId5"/>
-              </a:rPr>
-              <a:t> Esportes - Allianz fecha acordo de </a:t>
-            </a:r>
-            <a:r>
-              <a:rPr lang="pt-BR" sz="1800" dirty="0" err="1" smtClean="0">
-                <a:hlinkClick r:id="rId5"/>
-              </a:rPr>
-              <a:t>naming</a:t>
-            </a:r>
-            <a:r>
-              <a:rPr lang="pt-BR" sz="1800" dirty="0" smtClean="0">
-                <a:hlinkClick r:id="rId5"/>
-              </a:rPr>
-              <a:t> </a:t>
-            </a:r>
-            <a:r>
-              <a:rPr lang="pt-BR" sz="1800" dirty="0" err="1" smtClean="0">
-                <a:hlinkClick r:id="rId5"/>
-              </a:rPr>
-              <a:t>rights</a:t>
-            </a:r>
-            <a:r>
-              <a:rPr lang="pt-BR" sz="1800" dirty="0" smtClean="0">
-                <a:hlinkClick r:id="rId5"/>
-              </a:rPr>
-              <a:t> da arena palestra</a:t>
-            </a:r>
-            <a:r>
-              <a:rPr lang="pt-BR" sz="1800" dirty="0" smtClean="0"/>
-              <a:t/>
-            </a:r>
-            <a:br>
-              <a:rPr lang="pt-BR" sz="1800" dirty="0" smtClean="0"/>
-            </a:br>
-            <a:r>
-              <a:rPr lang="pt-BR" sz="1800" dirty="0"/>
-              <a:t/>
-            </a:r>
-            <a:br>
-              <a:rPr lang="pt-BR" sz="1800" dirty="0"/>
-            </a:br>
-            <a:r>
-              <a:rPr lang="pt-BR" sz="1800" dirty="0" smtClean="0">
-                <a:hlinkClick r:id="rId6"/>
-              </a:rPr>
-              <a:t>Época Negócios - Brasil tem 230 milhões de smartphones em uso</a:t>
-            </a:r>
-            <a:endParaRPr lang="pt-BR" sz="1800" dirty="0"/>
-          </a:p>
-        </p:txBody>
-      </p:sp>
-      <p:pic>
-        <p:nvPicPr>
-          <p:cNvPr id="3" name="Picture 5" descr="D:\ATA 2015\Logos 2015\Bebedouro\Logo_Etec branco.png"/>
-          <p:cNvPicPr>
-            <a:picLocks noChangeAspect="1" noChangeArrowheads="1"/>
-          </p:cNvPicPr>
-          <p:nvPr/>
-        </p:nvPicPr>
-        <p:blipFill>
-          <a:blip r:embed="rId7" cstate="print">
-            <a:extLst>
-              <a:ext uri="{28A0092B-C50C-407E-A947-70E740481C1C}">
-                <a14:useLocalDpi xmlns:a14="http://schemas.microsoft.com/office/drawing/2010/main" val="0"/>
-              </a:ext>
-            </a:extLst>
-          </a:blip>
-          <a:srcRect/>
-          <a:stretch>
-            <a:fillRect/>
-          </a:stretch>
-        </p:blipFill>
-        <p:spPr bwMode="auto">
-          <a:xfrm>
-            <a:off x="5940152" y="6164162"/>
-            <a:ext cx="720080" cy="459272"/>
-          </a:xfrm>
-          <a:prstGeom prst="rect">
-            <a:avLst/>
-          </a:prstGeom>
-          <a:noFill/>
-          <a:ln>
-            <a:noFill/>
-          </a:ln>
-          <a:extLst>
-            <a:ext uri="{909E8E84-426E-40DD-AFC4-6F175D3DCCD1}">
-              <a14:hiddenFill xmlns:a14="http://schemas.microsoft.com/office/drawing/2010/main">
-                <a:solidFill>
-                  <a:srgbClr val="FFFFFF"/>
-                </a:solidFill>
-              </a14:hiddenFill>
-            </a:ext>
-            <a:ext uri="{91240B29-F687-4F45-9708-019B960494DF}">
-              <a14:hiddenLine xmlns:a14="http://schemas.microsoft.com/office/drawing/2010/main" w="9525">
-                <a:solidFill>
-                  <a:srgbClr val="000000"/>
-                </a:solidFill>
-                <a:miter lim="800000"/>
-                <a:headEnd/>
-                <a:tailEnd/>
-              </a14:hiddenLine>
-            </a:ext>
-          </a:extLst>
-        </p:spPr>
-      </p:pic>
-      <p:sp>
-        <p:nvSpPr>
-          <p:cNvPr id="4" name="CaixaDeTexto 3"/>
-          <p:cNvSpPr txBox="1"/>
-          <p:nvPr/>
-        </p:nvSpPr>
-        <p:spPr>
-          <a:xfrm>
-            <a:off x="440879" y="1270192"/>
-            <a:ext cx="871008" cy="369332"/>
-          </a:xfrm>
-          <a:prstGeom prst="rect">
-            <a:avLst/>
-          </a:prstGeom>
-          <a:noFill/>
-        </p:spPr>
-        <p:txBody>
-          <a:bodyPr wrap="none" rtlCol="0">
-            <a:spAutoFit/>
-          </a:bodyPr>
-          <a:lstStyle/>
-          <a:p>
-            <a:r>
-              <a:rPr lang="pt-BR" dirty="0" smtClean="0">
-                <a:solidFill>
-                  <a:schemeClr val="bg1">
-                    <a:lumMod val="50000"/>
-                  </a:schemeClr>
-                </a:solidFill>
-              </a:rPr>
-              <a:t>Fontes:</a:t>
-            </a:r>
-            <a:endParaRPr lang="pt-BR" dirty="0">
-              <a:solidFill>
-                <a:schemeClr val="bg1">
-                  <a:lumMod val="50000"/>
-                </a:schemeClr>
-              </a:solidFill>
-            </a:endParaRPr>
-          </a:p>
-        </p:txBody>
-      </p:sp>
-    </p:spTree>
-    <p:extLst>
-      <p:ext uri="{BB962C8B-B14F-4D97-AF65-F5344CB8AC3E}">
-        <p14:creationId xmlns:p14="http://schemas.microsoft.com/office/powerpoint/2010/main" val="1224790015"/>
-      </p:ext>
-    </p:extLst>
-  </p:cSld>
-  <p:clrMapOvr>
-    <a:masterClrMapping/>
-  </p:clrMapOvr>
-  <p:timing>
-    <p:tnLst>
-      <p:par>
-        <p:cTn id="1" dur="indefinite" restart="never" nodeType="tmRoot"/>
-      </p:par>
-    </p:tnLst>
-  </p:timing>
-</p:sld>
-</file>
-
-<file path=ppt/slides/slide11.xml><?xml version="1.0" encoding="utf-8"?>
-<p:sld xmlns:a="http://schemas.openxmlformats.org/drawingml/2006/main" xmlns:r="http://schemas.openxmlformats.org/officeDocument/2006/relationships" xmlns:p="http://schemas.openxmlformats.org/presentationml/2006/main">
-  <p:cSld>
-    <p:spTree>
-      <p:nvGrpSpPr>
-        <p:cNvPr id="1" name=""/>
-        <p:cNvGrpSpPr/>
-        <p:nvPr/>
-      </p:nvGrpSpPr>
-      <p:grpSpPr>
-        <a:xfrm>
-          <a:off x="0" y="0"/>
-          <a:ext cx="0" cy="0"/>
-          <a:chOff x="0" y="0"/>
-          <a:chExt cx="0" cy="0"/>
-        </a:xfrm>
-      </p:grpSpPr>
-      <p:pic>
-        <p:nvPicPr>
-          <p:cNvPr id="2" name="Imagem 1"/>
-          <p:cNvPicPr>
-            <a:picLocks noChangeAspect="1"/>
-          </p:cNvPicPr>
-          <p:nvPr/>
-        </p:nvPicPr>
-        <p:blipFill>
-          <a:blip r:embed="rId2" cstate="print">
-            <a:extLst>
-              <a:ext uri="{28A0092B-C50C-407E-A947-70E740481C1C}">
-                <a14:useLocalDpi xmlns:a14="http://schemas.microsoft.com/office/drawing/2010/main" val="0"/>
-              </a:ext>
-            </a:extLst>
-          </a:blip>
-          <a:stretch>
-            <a:fillRect/>
-          </a:stretch>
-        </p:blipFill>
-        <p:spPr>
-          <a:xfrm>
-            <a:off x="6444208" y="116632"/>
-            <a:ext cx="576064" cy="366822"/>
-          </a:xfrm>
-          <a:prstGeom prst="rect">
-            <a:avLst/>
-          </a:prstGeom>
-        </p:spPr>
-      </p:pic>
-      <p:sp>
-        <p:nvSpPr>
-          <p:cNvPr id="3" name="CaixaDeTexto 2">
-            <a:extLst>
-              <a:ext uri="{FF2B5EF4-FFF2-40B4-BE49-F238E27FC236}">
-                <a16:creationId xmlns:a16="http://schemas.microsoft.com/office/drawing/2014/main" id="{01F97DBE-010A-45A5-BF65-B8517B5D0D76}"/>
-              </a:ext>
-            </a:extLst>
-          </p:cNvPr>
-          <p:cNvSpPr txBox="1"/>
-          <p:nvPr/>
-        </p:nvSpPr>
-        <p:spPr>
-          <a:xfrm>
-            <a:off x="7271792" y="5013176"/>
-            <a:ext cx="1872208" cy="1754326"/>
-          </a:xfrm>
-          <a:prstGeom prst="rect">
-            <a:avLst/>
-          </a:prstGeom>
-          <a:noFill/>
-        </p:spPr>
-        <p:txBody>
-          <a:bodyPr wrap="square" rtlCol="0">
-            <a:spAutoFit/>
-          </a:bodyPr>
-          <a:lstStyle/>
-          <a:p>
-            <a:r>
-              <a:rPr lang="pt-BR" b="1" dirty="0">
-                <a:solidFill>
-                  <a:srgbClr val="606062"/>
-                </a:solidFill>
-              </a:rPr>
-              <a:t>Grupo:</a:t>
-            </a:r>
-          </a:p>
-          <a:p>
-            <a:r>
-              <a:rPr lang="pt-BR" dirty="0" smtClean="0">
-                <a:solidFill>
-                  <a:srgbClr val="606062"/>
-                </a:solidFill>
-              </a:rPr>
-              <a:t>Caio Rodrigues</a:t>
-            </a:r>
-            <a:endParaRPr lang="pt-BR" dirty="0">
-              <a:solidFill>
-                <a:srgbClr val="606062"/>
-              </a:solidFill>
-            </a:endParaRPr>
-          </a:p>
-          <a:p>
-            <a:r>
-              <a:rPr lang="pt-BR" dirty="0" smtClean="0">
-                <a:solidFill>
-                  <a:srgbClr val="606062"/>
-                </a:solidFill>
-              </a:rPr>
-              <a:t>Junior Zanata</a:t>
-            </a:r>
-            <a:endParaRPr lang="pt-BR" dirty="0">
-              <a:solidFill>
-                <a:srgbClr val="606062"/>
-              </a:solidFill>
-            </a:endParaRPr>
-          </a:p>
-          <a:p>
-            <a:r>
-              <a:rPr lang="pt-BR" dirty="0" smtClean="0">
-                <a:solidFill>
-                  <a:srgbClr val="606062"/>
-                </a:solidFill>
-              </a:rPr>
-              <a:t>Leandro Ferreira</a:t>
-            </a:r>
-            <a:endParaRPr lang="pt-BR" dirty="0">
-              <a:solidFill>
-                <a:srgbClr val="606062"/>
-              </a:solidFill>
-            </a:endParaRPr>
-          </a:p>
-          <a:p>
-            <a:r>
-              <a:rPr lang="pt-BR" dirty="0" smtClean="0">
-                <a:solidFill>
-                  <a:srgbClr val="606062"/>
-                </a:solidFill>
-              </a:rPr>
-              <a:t>Rogério </a:t>
-            </a:r>
-            <a:r>
-              <a:rPr lang="pt-BR" dirty="0" err="1" smtClean="0">
-                <a:solidFill>
-                  <a:srgbClr val="606062"/>
-                </a:solidFill>
-              </a:rPr>
-              <a:t>Takeshi</a:t>
-            </a:r>
-            <a:endParaRPr lang="pt-BR" dirty="0">
-              <a:solidFill>
-                <a:srgbClr val="606062"/>
-              </a:solidFill>
-            </a:endParaRPr>
-          </a:p>
-          <a:p>
-            <a:r>
-              <a:rPr lang="pt-BR" dirty="0" smtClean="0">
-                <a:solidFill>
-                  <a:srgbClr val="606062"/>
-                </a:solidFill>
-              </a:rPr>
-              <a:t>Victor Guedes </a:t>
-            </a:r>
-            <a:endParaRPr lang="pt-BR" dirty="0">
-              <a:solidFill>
-                <a:srgbClr val="606062"/>
-              </a:solidFill>
-            </a:endParaRPr>
-          </a:p>
-        </p:txBody>
-      </p:sp>
-      <p:pic>
-        <p:nvPicPr>
-          <p:cNvPr id="6" name="Imagem 5">
-            <a:extLst>
-              <a:ext uri="{FF2B5EF4-FFF2-40B4-BE49-F238E27FC236}">
-                <a16:creationId xmlns:a16="http://schemas.microsoft.com/office/drawing/2014/main" id="{9CDB29EE-15E9-4BDC-9AF8-F264B4B5914B}"/>
-              </a:ext>
-            </a:extLst>
-          </p:cNvPr>
-          <p:cNvPicPr>
-            <a:picLocks noChangeAspect="1"/>
-          </p:cNvPicPr>
-          <p:nvPr/>
-        </p:nvPicPr>
-        <p:blipFill>
-          <a:blip r:embed="rId3" cstate="print">
-            <a:extLst>
-              <a:ext uri="{28A0092B-C50C-407E-A947-70E740481C1C}">
-                <a14:useLocalDpi xmlns:a14="http://schemas.microsoft.com/office/drawing/2010/main" val="0"/>
-              </a:ext>
-            </a:extLst>
-          </a:blip>
-          <a:stretch>
-            <a:fillRect/>
-          </a:stretch>
-        </p:blipFill>
-        <p:spPr>
-          <a:xfrm>
-            <a:off x="323528" y="1052736"/>
-            <a:ext cx="1296144" cy="1043665"/>
-          </a:xfrm>
-          <a:prstGeom prst="rect">
-            <a:avLst/>
-          </a:prstGeom>
-        </p:spPr>
-      </p:pic>
-      <p:sp>
-        <p:nvSpPr>
-          <p:cNvPr id="4" name="CaixaDeTexto 3"/>
-          <p:cNvSpPr txBox="1"/>
-          <p:nvPr/>
-        </p:nvSpPr>
-        <p:spPr>
-          <a:xfrm>
-            <a:off x="3131840" y="3140968"/>
-            <a:ext cx="2577950" cy="584775"/>
-          </a:xfrm>
-          <a:prstGeom prst="rect">
-            <a:avLst/>
-          </a:prstGeom>
-          <a:noFill/>
-        </p:spPr>
-        <p:txBody>
-          <a:bodyPr wrap="none" rtlCol="0">
-            <a:spAutoFit/>
-          </a:bodyPr>
-          <a:lstStyle/>
-          <a:p>
-            <a:r>
-              <a:rPr lang="pt-BR" sz="3200" b="1" dirty="0" smtClean="0">
-                <a:solidFill>
-                  <a:schemeClr val="bg1">
-                    <a:lumMod val="50000"/>
-                  </a:schemeClr>
-                </a:solidFill>
-                <a:latin typeface="Arial" panose="020B0604020202020204" pitchFamily="34" charset="0"/>
-                <a:cs typeface="Arial" panose="020B0604020202020204" pitchFamily="34" charset="0"/>
-              </a:rPr>
-              <a:t>OBRIGADO!</a:t>
-            </a:r>
-            <a:endParaRPr lang="pt-BR" sz="3200" b="1" dirty="0">
-              <a:solidFill>
-                <a:schemeClr val="bg1">
-                  <a:lumMod val="50000"/>
-                </a:schemeClr>
-              </a:solidFill>
-              <a:latin typeface="Arial" panose="020B0604020202020204" pitchFamily="34" charset="0"/>
-              <a:cs typeface="Arial" panose="020B0604020202020204" pitchFamily="34" charset="0"/>
-            </a:endParaRPr>
-          </a:p>
-        </p:txBody>
-      </p:sp>
-    </p:spTree>
-    <p:extLst>
-      <p:ext uri="{BB962C8B-B14F-4D97-AF65-F5344CB8AC3E}">
-        <p14:creationId xmlns:p14="http://schemas.microsoft.com/office/powerpoint/2010/main" val="1928374318"/>
-      </p:ext>
-    </p:extLst>
-  </p:cSld>
-  <p:clrMapOvr>
-    <a:masterClrMapping/>
-  </p:clrMapOvr>
-  <p:timing>
-    <p:tnLst>
-      <p:par>
-        <p:cTn id="1" dur="indefinite" restart="never" nodeType="tmRoot"/>
-      </p:par>
-    </p:tnLst>
-  </p:timing>
-</p:sld>
-</file>
-
 <file path=ppt/slides/slide2.xml><?xml version="1.0" encoding="utf-8"?>
 <p:sld xmlns:a="http://schemas.openxmlformats.org/drawingml/2006/main" xmlns:r="http://schemas.openxmlformats.org/officeDocument/2006/relationships" xmlns:p="http://schemas.openxmlformats.org/presentationml/2006/main">
   <p:cSld>
@@ -3316,10 +2750,10 @@
       </p:grpSpPr>
       <p:pic>
         <p:nvPicPr>
-          <p:cNvPr id="6" name="Imagem 5">
+          <p:cNvPr id="7" name="Imagem 6">
             <a:extLst>
               <a:ext uri="{FF2B5EF4-FFF2-40B4-BE49-F238E27FC236}">
-                <a16:creationId xmlns:a16="http://schemas.microsoft.com/office/drawing/2014/main" id="{BD3DE711-CD42-45EA-9806-33AD1101BB03}"/>
+                <a16:creationId xmlns:a16="http://schemas.microsoft.com/office/drawing/2014/main" id="{36F859FA-C17A-45AE-8FFD-3917379ED478}"/>
               </a:ext>
             </a:extLst>
           </p:cNvPr>
@@ -3342,219 +2776,20 @@
         </p:blipFill>
         <p:spPr>
           <a:xfrm>
-            <a:off x="4708805" y="2950796"/>
-            <a:ext cx="1986278" cy="1501256"/>
+            <a:off x="2738899" y="302494"/>
+            <a:ext cx="3312533" cy="1299665"/>
           </a:xfrm>
           <a:prstGeom prst="rect">
             <a:avLst/>
           </a:prstGeom>
         </p:spPr>
       </p:pic>
-      <p:sp>
-        <p:nvSpPr>
-          <p:cNvPr id="2" name="Título 1">
-            <a:extLst>
-              <a:ext uri="{FF2B5EF4-FFF2-40B4-BE49-F238E27FC236}">
-                <a16:creationId xmlns:a16="http://schemas.microsoft.com/office/drawing/2014/main" id="{0B901B2E-79FA-408E-AA83-AE43AF386D86}"/>
-              </a:ext>
-            </a:extLst>
-          </p:cNvPr>
-          <p:cNvSpPr>
-            <a:spLocks noGrp="1"/>
-          </p:cNvSpPr>
-          <p:nvPr>
-            <p:ph type="title"/>
-          </p:nvPr>
-        </p:nvSpPr>
-        <p:spPr>
-          <a:xfrm>
-            <a:off x="467544" y="692696"/>
-            <a:ext cx="8229600" cy="1143000"/>
-          </a:xfrm>
-          <a:noFill/>
-        </p:spPr>
-        <p:txBody>
-          <a:bodyPr vert="horz" lIns="91440" tIns="45720" rIns="91440" bIns="45720" rtlCol="0" anchor="b">
-            <a:normAutofit/>
-          </a:bodyPr>
-          <a:lstStyle/>
-          <a:p>
-            <a:pPr>
-              <a:lnSpc>
-                <a:spcPct val="90000"/>
-              </a:lnSpc>
-            </a:pPr>
-            <a:r>
-              <a:rPr lang="en-US" sz="2900" dirty="0">
-                <a:solidFill>
-                  <a:schemeClr val="tx1">
-                    <a:lumMod val="75000"/>
-                    <a:lumOff val="25000"/>
-                  </a:schemeClr>
-                </a:solidFill>
-              </a:rPr>
-              <a:t>O </a:t>
-            </a:r>
-            <a:r>
-              <a:rPr lang="en-US" sz="2900" dirty="0" err="1">
-                <a:solidFill>
-                  <a:schemeClr val="tx1">
-                    <a:lumMod val="75000"/>
-                    <a:lumOff val="25000"/>
-                  </a:schemeClr>
-                </a:solidFill>
-              </a:rPr>
-              <a:t>setor</a:t>
-            </a:r>
-            <a:r>
-              <a:rPr lang="en-US" sz="2900" dirty="0">
-                <a:solidFill>
-                  <a:schemeClr val="tx1">
-                    <a:lumMod val="75000"/>
-                    <a:lumOff val="25000"/>
-                  </a:schemeClr>
-                </a:solidFill>
-              </a:rPr>
-              <a:t> </a:t>
-            </a:r>
-            <a:r>
-              <a:rPr lang="en-US" sz="2900" dirty="0" err="1">
-                <a:solidFill>
-                  <a:schemeClr val="tx1">
-                    <a:lumMod val="75000"/>
-                    <a:lumOff val="25000"/>
-                  </a:schemeClr>
-                </a:solidFill>
-              </a:rPr>
-              <a:t>automotivo</a:t>
-            </a:r>
-            <a:r>
-              <a:rPr lang="en-US" sz="2900" dirty="0">
-                <a:solidFill>
-                  <a:schemeClr val="tx1">
-                    <a:lumMod val="75000"/>
-                    <a:lumOff val="25000"/>
-                  </a:schemeClr>
-                </a:solidFill>
-              </a:rPr>
-              <a:t> </a:t>
-            </a:r>
-            <a:r>
-              <a:rPr lang="en-US" sz="2900" dirty="0" err="1" smtClean="0">
-                <a:solidFill>
-                  <a:schemeClr val="tx1">
-                    <a:lumMod val="75000"/>
-                    <a:lumOff val="25000"/>
-                  </a:schemeClr>
-                </a:solidFill>
-              </a:rPr>
-              <a:t>gastou</a:t>
-            </a:r>
-            <a:r>
-              <a:rPr lang="en-US" sz="2900" dirty="0" smtClean="0">
-                <a:solidFill>
-                  <a:schemeClr val="tx1">
-                    <a:lumMod val="75000"/>
-                    <a:lumOff val="25000"/>
-                  </a:schemeClr>
-                </a:solidFill>
-              </a:rPr>
-              <a:t> em </a:t>
-            </a:r>
-            <a:r>
-              <a:rPr lang="en-US" sz="2900" dirty="0" err="1" smtClean="0">
-                <a:solidFill>
-                  <a:schemeClr val="tx1">
-                    <a:lumMod val="75000"/>
-                    <a:lumOff val="25000"/>
-                  </a:schemeClr>
-                </a:solidFill>
-              </a:rPr>
-              <a:t>publicidade</a:t>
-            </a:r>
-            <a:r>
-              <a:rPr lang="en-US" sz="2900" dirty="0" smtClean="0">
-                <a:solidFill>
-                  <a:schemeClr val="tx1">
-                    <a:lumMod val="75000"/>
-                    <a:lumOff val="25000"/>
-                  </a:schemeClr>
-                </a:solidFill>
-              </a:rPr>
-              <a:t> </a:t>
-            </a:r>
-            <a:r>
-              <a:rPr lang="en-US" sz="2900" dirty="0">
-                <a:solidFill>
-                  <a:schemeClr val="tx1">
-                    <a:lumMod val="75000"/>
-                    <a:lumOff val="25000"/>
-                  </a:schemeClr>
-                </a:solidFill>
-              </a:rPr>
-              <a:t>R</a:t>
-            </a:r>
-            <a:r>
-              <a:rPr lang="en-US" sz="2900" dirty="0" smtClean="0">
-                <a:solidFill>
-                  <a:schemeClr val="tx1">
-                    <a:lumMod val="75000"/>
-                    <a:lumOff val="25000"/>
-                  </a:schemeClr>
-                </a:solidFill>
-              </a:rPr>
-              <a:t>$ 6,9 </a:t>
-            </a:r>
-            <a:r>
-              <a:rPr lang="en-US" sz="2900" dirty="0" err="1">
-                <a:solidFill>
-                  <a:schemeClr val="tx1">
-                    <a:lumMod val="75000"/>
-                    <a:lumOff val="25000"/>
-                  </a:schemeClr>
-                </a:solidFill>
-              </a:rPr>
-              <a:t>Bilhões</a:t>
-            </a:r>
-            <a:r>
-              <a:rPr lang="en-US" sz="2900" dirty="0">
-                <a:solidFill>
-                  <a:schemeClr val="tx1">
-                    <a:lumMod val="75000"/>
-                    <a:lumOff val="25000"/>
-                  </a:schemeClr>
-                </a:solidFill>
-              </a:rPr>
-              <a:t> em </a:t>
-            </a:r>
-            <a:r>
-              <a:rPr lang="en-US" sz="2900" dirty="0" smtClean="0">
-                <a:solidFill>
-                  <a:schemeClr val="tx1">
-                    <a:lumMod val="75000"/>
-                    <a:lumOff val="25000"/>
-                  </a:schemeClr>
-                </a:solidFill>
-              </a:rPr>
-              <a:t>2013. </a:t>
-            </a:r>
-            <a:endParaRPr lang="en-US" sz="2900" dirty="0">
-              <a:solidFill>
-                <a:schemeClr val="tx1">
-                  <a:lumMod val="75000"/>
-                  <a:lumOff val="25000"/>
-                </a:schemeClr>
-              </a:solidFill>
-            </a:endParaRPr>
-          </a:p>
-        </p:txBody>
-      </p:sp>
       <p:pic>
         <p:nvPicPr>
-          <p:cNvPr id="4" name="Imagem 3">
+          <p:cNvPr id="9" name="Imagem 8">
             <a:extLst>
               <a:ext uri="{FF2B5EF4-FFF2-40B4-BE49-F238E27FC236}">
-                <a16:creationId xmlns:a16="http://schemas.microsoft.com/office/drawing/2014/main" id="{0442D338-DDF0-4C2D-BF97-E46E9910E28A}"/>
+                <a16:creationId xmlns:a16="http://schemas.microsoft.com/office/drawing/2014/main" id="{F71EA765-6142-4399-BA44-60CBA14F2C78}"/>
               </a:ext>
             </a:extLst>
           </p:cNvPr>
@@ -3577,20 +2812,250 @@
         </p:blipFill>
         <p:spPr>
           <a:xfrm>
-            <a:off x="256191" y="3349876"/>
-            <a:ext cx="1994604" cy="703097"/>
+            <a:off x="5740518" y="3222960"/>
+            <a:ext cx="3312534" cy="2690484"/>
           </a:xfrm>
           <a:prstGeom prst="rect">
             <a:avLst/>
           </a:prstGeom>
         </p:spPr>
       </p:pic>
+      <p:sp>
+        <p:nvSpPr>
+          <p:cNvPr id="4" name="Título 1"/>
+          <p:cNvSpPr>
+            <a:spLocks noGrp="1"/>
+          </p:cNvSpPr>
+          <p:nvPr>
+            <p:ph type="title"/>
+          </p:nvPr>
+        </p:nvSpPr>
+        <p:spPr>
+          <a:xfrm>
+            <a:off x="115351" y="597884"/>
+            <a:ext cx="3113556" cy="3970318"/>
+          </a:xfrm>
+        </p:spPr>
+        <p:txBody>
+          <a:bodyPr vert="horz" lIns="91440" tIns="45720" rIns="91440" bIns="45720" rtlCol="0" anchor="b">
+            <a:normAutofit/>
+          </a:bodyPr>
+          <a:lstStyle/>
+          <a:p>
+            <a:pPr algn="l">
+              <a:lnSpc>
+                <a:spcPct val="90000"/>
+              </a:lnSpc>
+            </a:pPr>
+            <a:r>
+              <a:rPr lang="en-US" sz="2000" b="1" kern="1200" dirty="0">
+                <a:solidFill>
+                  <a:schemeClr val="tx1"/>
+                </a:solidFill>
+                <a:latin typeface="Arial" panose="020B0604020202020204" pitchFamily="34" charset="0"/>
+                <a:cs typeface="Arial" panose="020B0604020202020204" pitchFamily="34" charset="0"/>
+              </a:rPr>
+              <a:t>Possíveis clientes</a:t>
+            </a:r>
+            <a:r>
+              <a:rPr lang="en-US" sz="2000" b="1" kern="1200" dirty="0" smtClean="0">
+                <a:solidFill>
+                  <a:schemeClr val="tx1"/>
+                </a:solidFill>
+                <a:latin typeface="Arial" panose="020B0604020202020204" pitchFamily="34" charset="0"/>
+                <a:cs typeface="Arial" panose="020B0604020202020204" pitchFamily="34" charset="0"/>
+              </a:rPr>
+              <a:t>:</a:t>
+            </a:r>
+            <a:r>
+              <a:rPr lang="en-US" sz="2000" kern="1200" dirty="0" smtClean="0">
+                <a:solidFill>
+                  <a:schemeClr val="tx1"/>
+                </a:solidFill>
+                <a:latin typeface="Calibri Light" panose="020F0302020204030204" pitchFamily="34" charset="0"/>
+                <a:cs typeface="Calibri Light" panose="020F0302020204030204" pitchFamily="34" charset="0"/>
+              </a:rPr>
+              <a:t/>
+            </a:r>
+            <a:br>
+              <a:rPr lang="en-US" sz="2000" kern="1200" dirty="0" smtClean="0">
+                <a:solidFill>
+                  <a:schemeClr val="tx1"/>
+                </a:solidFill>
+                <a:latin typeface="Calibri Light" panose="020F0302020204030204" pitchFamily="34" charset="0"/>
+                <a:cs typeface="Calibri Light" panose="020F0302020204030204" pitchFamily="34" charset="0"/>
+              </a:rPr>
+            </a:br>
+            <a:r>
+              <a:rPr lang="en-US" sz="2000" dirty="0">
+                <a:latin typeface="Calibri Light" panose="020F0302020204030204" pitchFamily="34" charset="0"/>
+                <a:cs typeface="Calibri Light" panose="020F0302020204030204" pitchFamily="34" charset="0"/>
+              </a:rPr>
+              <a:t/>
+            </a:r>
+            <a:br>
+              <a:rPr lang="en-US" sz="2000" dirty="0">
+                <a:latin typeface="Calibri Light" panose="020F0302020204030204" pitchFamily="34" charset="0"/>
+                <a:cs typeface="Calibri Light" panose="020F0302020204030204" pitchFamily="34" charset="0"/>
+              </a:rPr>
+            </a:br>
+            <a:r>
+              <a:rPr lang="en-US" sz="2000" dirty="0" smtClean="0">
+                <a:latin typeface="Calibri Light" panose="020F0302020204030204" pitchFamily="34" charset="0"/>
+                <a:cs typeface="Calibri Light" panose="020F0302020204030204" pitchFamily="34" charset="0"/>
+              </a:rPr>
+              <a:t>- Seguradoras;</a:t>
+            </a:r>
+            <a:r>
+              <a:rPr lang="en-US" sz="2000" dirty="0">
+                <a:latin typeface="Calibri Light" panose="020F0302020204030204" pitchFamily="34" charset="0"/>
+                <a:cs typeface="Calibri Light" panose="020F0302020204030204" pitchFamily="34" charset="0"/>
+              </a:rPr>
+              <a:t/>
+            </a:r>
+            <a:br>
+              <a:rPr lang="en-US" sz="2000" dirty="0">
+                <a:latin typeface="Calibri Light" panose="020F0302020204030204" pitchFamily="34" charset="0"/>
+                <a:cs typeface="Calibri Light" panose="020F0302020204030204" pitchFamily="34" charset="0"/>
+              </a:rPr>
+            </a:br>
+            <a:r>
+              <a:rPr lang="en-US" sz="2000" dirty="0" smtClean="0">
+                <a:latin typeface="Calibri Light" panose="020F0302020204030204" pitchFamily="34" charset="0"/>
+                <a:cs typeface="Calibri Light" panose="020F0302020204030204" pitchFamily="34" charset="0"/>
+              </a:rPr>
+              <a:t>- Montadoras </a:t>
+            </a:r>
+            <a:r>
+              <a:rPr lang="en-US" sz="2000" dirty="0">
+                <a:latin typeface="Calibri Light" panose="020F0302020204030204" pitchFamily="34" charset="0"/>
+                <a:cs typeface="Calibri Light" panose="020F0302020204030204" pitchFamily="34" charset="0"/>
+              </a:rPr>
+              <a:t>de veículos;</a:t>
+            </a:r>
+            <a:br>
+              <a:rPr lang="en-US" sz="2000" dirty="0">
+                <a:latin typeface="Calibri Light" panose="020F0302020204030204" pitchFamily="34" charset="0"/>
+                <a:cs typeface="Calibri Light" panose="020F0302020204030204" pitchFamily="34" charset="0"/>
+              </a:rPr>
+            </a:br>
+            <a:r>
+              <a:rPr lang="en-US" sz="2000" dirty="0" smtClean="0">
+                <a:latin typeface="Calibri Light" panose="020F0302020204030204" pitchFamily="34" charset="0"/>
+                <a:cs typeface="Calibri Light" panose="020F0302020204030204" pitchFamily="34" charset="0"/>
+              </a:rPr>
+              <a:t>- Fabricantes </a:t>
+            </a:r>
+            <a:r>
+              <a:rPr lang="en-US" sz="2000" dirty="0">
+                <a:latin typeface="Calibri Light" panose="020F0302020204030204" pitchFamily="34" charset="0"/>
+                <a:cs typeface="Calibri Light" panose="020F0302020204030204" pitchFamily="34" charset="0"/>
+              </a:rPr>
+              <a:t>de pneus;</a:t>
+            </a:r>
+            <a:br>
+              <a:rPr lang="en-US" sz="2000" dirty="0">
+                <a:latin typeface="Calibri Light" panose="020F0302020204030204" pitchFamily="34" charset="0"/>
+                <a:cs typeface="Calibri Light" panose="020F0302020204030204" pitchFamily="34" charset="0"/>
+              </a:rPr>
+            </a:br>
+            <a:r>
+              <a:rPr lang="en-US" sz="2000" dirty="0" smtClean="0">
+                <a:latin typeface="Calibri Light" panose="020F0302020204030204" pitchFamily="34" charset="0"/>
+                <a:cs typeface="Calibri Light" panose="020F0302020204030204" pitchFamily="34" charset="0"/>
+              </a:rPr>
+              <a:t>- Fabricantes </a:t>
+            </a:r>
+            <a:r>
+              <a:rPr lang="en-US" sz="2000" dirty="0">
+                <a:latin typeface="Calibri Light" panose="020F0302020204030204" pitchFamily="34" charset="0"/>
+                <a:cs typeface="Calibri Light" panose="020F0302020204030204" pitchFamily="34" charset="0"/>
+              </a:rPr>
+              <a:t>de peças e acessórios;</a:t>
+            </a:r>
+            <a:br>
+              <a:rPr lang="en-US" sz="2000" dirty="0">
+                <a:latin typeface="Calibri Light" panose="020F0302020204030204" pitchFamily="34" charset="0"/>
+                <a:cs typeface="Calibri Light" panose="020F0302020204030204" pitchFamily="34" charset="0"/>
+              </a:rPr>
+            </a:br>
+            <a:r>
+              <a:rPr lang="en-US" sz="2000" dirty="0" smtClean="0">
+                <a:latin typeface="Calibri Light" panose="020F0302020204030204" pitchFamily="34" charset="0"/>
+                <a:cs typeface="Calibri Light" panose="020F0302020204030204" pitchFamily="34" charset="0"/>
+              </a:rPr>
+              <a:t>- Oficinas </a:t>
+            </a:r>
+            <a:r>
+              <a:rPr lang="en-US" sz="2000" dirty="0">
+                <a:latin typeface="Calibri Light" panose="020F0302020204030204" pitchFamily="34" charset="0"/>
+                <a:cs typeface="Calibri Light" panose="020F0302020204030204" pitchFamily="34" charset="0"/>
+              </a:rPr>
+              <a:t>mecanicas; </a:t>
+            </a:r>
+            <a:br>
+              <a:rPr lang="en-US" sz="2000" dirty="0">
+                <a:latin typeface="Calibri Light" panose="020F0302020204030204" pitchFamily="34" charset="0"/>
+                <a:cs typeface="Calibri Light" panose="020F0302020204030204" pitchFamily="34" charset="0"/>
+              </a:rPr>
+            </a:br>
+            <a:r>
+              <a:rPr lang="en-US" sz="2000" dirty="0" smtClean="0">
+                <a:latin typeface="Calibri Light" panose="020F0302020204030204" pitchFamily="34" charset="0"/>
+                <a:cs typeface="Calibri Light" panose="020F0302020204030204" pitchFamily="34" charset="0"/>
+              </a:rPr>
+              <a:t>- Fabricantes </a:t>
+            </a:r>
+            <a:r>
+              <a:rPr lang="en-US" sz="2000" dirty="0">
+                <a:latin typeface="Calibri Light" panose="020F0302020204030204" pitchFamily="34" charset="0"/>
+                <a:cs typeface="Calibri Light" panose="020F0302020204030204" pitchFamily="34" charset="0"/>
+              </a:rPr>
+              <a:t>de lubrificantes, ceras e afins.</a:t>
+            </a:r>
+            <a:r>
+              <a:rPr lang="en-US" sz="2000" dirty="0">
+                <a:latin typeface="Century Gothic" panose="020B0502020202020204" pitchFamily="34" charset="0"/>
+              </a:rPr>
+              <a:t/>
+            </a:r>
+            <a:br>
+              <a:rPr lang="en-US" sz="2000" dirty="0">
+                <a:latin typeface="Century Gothic" panose="020B0502020202020204" pitchFamily="34" charset="0"/>
+              </a:rPr>
+            </a:br>
+            <a:r>
+              <a:rPr lang="en-US" sz="2000" kern="1200" dirty="0">
+                <a:solidFill>
+                  <a:schemeClr val="tx1"/>
+                </a:solidFill>
+                <a:latin typeface="Century Gothic" panose="020B0502020202020204" pitchFamily="34" charset="0"/>
+              </a:rPr>
+              <a:t/>
+            </a:r>
+            <a:br>
+              <a:rPr lang="en-US" sz="2000" kern="1200" dirty="0">
+                <a:solidFill>
+                  <a:schemeClr val="tx1"/>
+                </a:solidFill>
+                <a:latin typeface="Century Gothic" panose="020B0502020202020204" pitchFamily="34" charset="0"/>
+              </a:rPr>
+            </a:br>
+            <a:endParaRPr lang="en-US" sz="2000" kern="1200" dirty="0">
+              <a:solidFill>
+                <a:schemeClr val="tx1"/>
+              </a:solidFill>
+              <a:latin typeface="Century Gothic" panose="020B0502020202020204" pitchFamily="34" charset="0"/>
+            </a:endParaRPr>
+          </a:p>
+        </p:txBody>
+      </p:sp>
       <p:pic>
         <p:nvPicPr>
-          <p:cNvPr id="8" name="Imagem 7">
+          <p:cNvPr id="13" name="Imagem 12">
             <a:extLst>
               <a:ext uri="{FF2B5EF4-FFF2-40B4-BE49-F238E27FC236}">
-                <a16:creationId xmlns:a16="http://schemas.microsoft.com/office/drawing/2014/main" id="{8DBC8C24-B90D-4190-9A00-CF65C519FC49}"/>
+                <a16:creationId xmlns:a16="http://schemas.microsoft.com/office/drawing/2014/main" id="{35E786EB-9196-4DA7-822B-32B8576857D8}"/>
               </a:ext>
             </a:extLst>
           </p:cNvPr>
@@ -3613,8 +3078,8 @@
         </p:blipFill>
         <p:spPr>
           <a:xfrm>
-            <a:off x="2483768" y="2708920"/>
-            <a:ext cx="1985008" cy="1985008"/>
+            <a:off x="3731520" y="2848853"/>
+            <a:ext cx="1642096" cy="1092740"/>
           </a:xfrm>
           <a:prstGeom prst="rect">
             <a:avLst/>
@@ -3623,10 +3088,10 @@
       </p:pic>
       <p:pic>
         <p:nvPicPr>
-          <p:cNvPr id="10" name="Imagem 9">
+          <p:cNvPr id="5" name="Imagem 4">
             <a:extLst>
               <a:ext uri="{FF2B5EF4-FFF2-40B4-BE49-F238E27FC236}">
-                <a16:creationId xmlns:a16="http://schemas.microsoft.com/office/drawing/2014/main" id="{4B3FB65A-058E-4FE5-9937-F78C3269C1AD}"/>
+                <a16:creationId xmlns:a16="http://schemas.microsoft.com/office/drawing/2014/main" id="{70757C8B-31DC-48D2-8B19-5281436B0BC8}"/>
               </a:ext>
             </a:extLst>
           </p:cNvPr>
@@ -3649,8 +3114,264 @@
         </p:blipFill>
         <p:spPr>
           <a:xfrm>
-            <a:off x="6935112" y="3227169"/>
-            <a:ext cx="1986279" cy="993139"/>
+            <a:off x="5909310" y="1022504"/>
+            <a:ext cx="2997729" cy="1338271"/>
+          </a:xfrm>
+          <a:prstGeom prst="rect">
+            <a:avLst/>
+          </a:prstGeom>
+        </p:spPr>
+      </p:pic>
+      <p:cxnSp>
+        <p:nvCxnSpPr>
+          <p:cNvPr id="30" name="Straight Connector 17">
+            <a:extLst>
+              <a:ext uri="{FF2B5EF4-FFF2-40B4-BE49-F238E27FC236}">
+                <a16:creationId xmlns:a16="http://schemas.microsoft.com/office/drawing/2014/main" id="{DC034BB4-8B50-4484-85C4-0CE4699284D7}"/>
+              </a:ext>
+              <a:ext uri="{C183D7F6-B498-43B3-948B-1728B52AA6E4}">
+                <adec:decorative xmlns:adec="http://schemas.microsoft.com/office/drawing/2017/decorative" xmlns="" val="1"/>
+              </a:ext>
+            </a:extLst>
+          </p:cNvPr>
+          <p:cNvCxnSpPr>
+            <a:cxnSpLocks noGrp="1" noRot="1" noChangeAspect="1" noMove="1" noResize="1" noEditPoints="1" noAdjustHandles="1" noChangeArrowheads="1" noChangeShapeType="1"/>
+          </p:cNvCxnSpPr>
+          <p:nvPr>
+            <p:extLst>
+              <p:ext uri="{386F3935-93C4-4BCD-93E2-E3B085C9AB24}">
+                <p16:designElem xmlns:p16="http://schemas.microsoft.com/office/powerpoint/2015/main" val="1"/>
+              </p:ext>
+            </p:extLst>
+          </p:nvPr>
+        </p:nvCxnSpPr>
+        <p:spPr>
+          <a:xfrm>
+            <a:off x="5647996" y="0"/>
+            <a:ext cx="0" cy="6858000"/>
+          </a:xfrm>
+          <a:prstGeom prst="line">
+            <a:avLst/>
+          </a:prstGeom>
+          <a:ln w="38100" cap="sq">
+            <a:solidFill>
+              <a:schemeClr val="tx1">
+                <a:lumMod val="75000"/>
+                <a:lumOff val="25000"/>
+              </a:schemeClr>
+            </a:solidFill>
+          </a:ln>
+        </p:spPr>
+        <p:style>
+          <a:lnRef idx="1">
+            <a:schemeClr val="accent1"/>
+          </a:lnRef>
+          <a:fillRef idx="0">
+            <a:schemeClr val="accent1"/>
+          </a:fillRef>
+          <a:effectRef idx="0">
+            <a:schemeClr val="accent1"/>
+          </a:effectRef>
+          <a:fontRef idx="minor">
+            <a:schemeClr val="tx1"/>
+          </a:fontRef>
+        </p:style>
+      </p:cxnSp>
+      <p:cxnSp>
+        <p:nvCxnSpPr>
+          <p:cNvPr id="31" name="Straight Connector 19">
+            <a:extLst>
+              <a:ext uri="{FF2B5EF4-FFF2-40B4-BE49-F238E27FC236}">
+                <a16:creationId xmlns:a16="http://schemas.microsoft.com/office/drawing/2014/main" id="{81B200F7-B57A-4824-BB91-B6624450A5AC}"/>
+              </a:ext>
+              <a:ext uri="{C183D7F6-B498-43B3-948B-1728B52AA6E4}">
+                <adec:decorative xmlns:adec="http://schemas.microsoft.com/office/drawing/2017/decorative" xmlns="" val="1"/>
+              </a:ext>
+            </a:extLst>
+          </p:cNvPr>
+          <p:cNvCxnSpPr>
+            <a:cxnSpLocks noGrp="1" noRot="1" noChangeAspect="1" noMove="1" noResize="1" noEditPoints="1" noAdjustHandles="1" noChangeArrowheads="1" noChangeShapeType="1"/>
+          </p:cNvCxnSpPr>
+          <p:nvPr>
+            <p:extLst>
+              <p:ext uri="{386F3935-93C4-4BCD-93E2-E3B085C9AB24}">
+                <p16:designElem xmlns:p16="http://schemas.microsoft.com/office/powerpoint/2015/main" val="1"/>
+              </p:ext>
+            </p:extLst>
+          </p:nvPr>
+        </p:nvCxnSpPr>
+        <p:spPr>
+          <a:xfrm>
+            <a:off x="3490220" y="2228770"/>
+            <a:ext cx="2157776" cy="0"/>
+          </a:xfrm>
+          <a:prstGeom prst="line">
+            <a:avLst/>
+          </a:prstGeom>
+          <a:ln w="38100">
+            <a:solidFill>
+              <a:schemeClr val="tx1">
+                <a:lumMod val="75000"/>
+                <a:lumOff val="25000"/>
+              </a:schemeClr>
+            </a:solidFill>
+          </a:ln>
+        </p:spPr>
+        <p:style>
+          <a:lnRef idx="1">
+            <a:schemeClr val="accent1"/>
+          </a:lnRef>
+          <a:fillRef idx="0">
+            <a:schemeClr val="accent1"/>
+          </a:fillRef>
+          <a:effectRef idx="0">
+            <a:schemeClr val="accent1"/>
+          </a:effectRef>
+          <a:fontRef idx="minor">
+            <a:schemeClr val="tx1"/>
+          </a:fontRef>
+        </p:style>
+      </p:cxnSp>
+      <p:cxnSp>
+        <p:nvCxnSpPr>
+          <p:cNvPr id="32" name="Straight Connector 21">
+            <a:extLst>
+              <a:ext uri="{FF2B5EF4-FFF2-40B4-BE49-F238E27FC236}">
+                <a16:creationId xmlns:a16="http://schemas.microsoft.com/office/drawing/2014/main" id="{1902062F-7F47-41E5-8574-2D1492D58ED3}"/>
+              </a:ext>
+              <a:ext uri="{C183D7F6-B498-43B3-948B-1728B52AA6E4}">
+                <adec:decorative xmlns:adec="http://schemas.microsoft.com/office/drawing/2017/decorative" xmlns="" val="1"/>
+              </a:ext>
+            </a:extLst>
+          </p:cNvPr>
+          <p:cNvCxnSpPr>
+            <a:cxnSpLocks noGrp="1" noRot="1" noChangeAspect="1" noMove="1" noResize="1" noEditPoints="1" noAdjustHandles="1" noChangeArrowheads="1" noChangeShapeType="1"/>
+          </p:cNvCxnSpPr>
+          <p:nvPr>
+            <p:extLst>
+              <p:ext uri="{386F3935-93C4-4BCD-93E2-E3B085C9AB24}">
+                <p16:designElem xmlns:p16="http://schemas.microsoft.com/office/powerpoint/2015/main" val="1"/>
+              </p:ext>
+            </p:extLst>
+          </p:nvPr>
+        </p:nvCxnSpPr>
+        <p:spPr>
+          <a:xfrm>
+            <a:off x="5647995" y="3429000"/>
+            <a:ext cx="3497580" cy="0"/>
+          </a:xfrm>
+          <a:prstGeom prst="line">
+            <a:avLst/>
+          </a:prstGeom>
+          <a:ln w="38100">
+            <a:solidFill>
+              <a:schemeClr val="tx1">
+                <a:lumMod val="75000"/>
+                <a:lumOff val="25000"/>
+              </a:schemeClr>
+            </a:solidFill>
+          </a:ln>
+        </p:spPr>
+        <p:style>
+          <a:lnRef idx="1">
+            <a:schemeClr val="accent1"/>
+          </a:lnRef>
+          <a:fillRef idx="0">
+            <a:schemeClr val="accent1"/>
+          </a:fillRef>
+          <a:effectRef idx="0">
+            <a:schemeClr val="accent1"/>
+          </a:effectRef>
+          <a:fontRef idx="minor">
+            <a:schemeClr val="tx1"/>
+          </a:fontRef>
+        </p:style>
+      </p:cxnSp>
+      <p:cxnSp>
+        <p:nvCxnSpPr>
+          <p:cNvPr id="33" name="Straight Connector 23">
+            <a:extLst>
+              <a:ext uri="{FF2B5EF4-FFF2-40B4-BE49-F238E27FC236}">
+                <a16:creationId xmlns:a16="http://schemas.microsoft.com/office/drawing/2014/main" id="{FA92245C-961F-47D5-9691-272D28692D45}"/>
+              </a:ext>
+              <a:ext uri="{C183D7F6-B498-43B3-948B-1728B52AA6E4}">
+                <adec:decorative xmlns:adec="http://schemas.microsoft.com/office/drawing/2017/decorative" xmlns="" val="1"/>
+              </a:ext>
+            </a:extLst>
+          </p:cNvPr>
+          <p:cNvCxnSpPr>
+            <a:cxnSpLocks noGrp="1" noRot="1" noChangeAspect="1" noMove="1" noResize="1" noEditPoints="1" noAdjustHandles="1" noChangeArrowheads="1" noChangeShapeType="1"/>
+          </p:cNvCxnSpPr>
+          <p:nvPr>
+            <p:extLst>
+              <p:ext uri="{386F3935-93C4-4BCD-93E2-E3B085C9AB24}">
+                <p16:designElem xmlns:p16="http://schemas.microsoft.com/office/powerpoint/2015/main" val="1"/>
+              </p:ext>
+            </p:extLst>
+          </p:nvPr>
+        </p:nvCxnSpPr>
+        <p:spPr>
+          <a:xfrm>
+            <a:off x="3490220" y="4568202"/>
+            <a:ext cx="2157776" cy="0"/>
+          </a:xfrm>
+          <a:prstGeom prst="line">
+            <a:avLst/>
+          </a:prstGeom>
+          <a:ln w="38100">
+            <a:solidFill>
+              <a:schemeClr val="tx1">
+                <a:lumMod val="75000"/>
+                <a:lumOff val="25000"/>
+              </a:schemeClr>
+            </a:solidFill>
+          </a:ln>
+        </p:spPr>
+        <p:style>
+          <a:lnRef idx="1">
+            <a:schemeClr val="accent1"/>
+          </a:lnRef>
+          <a:fillRef idx="0">
+            <a:schemeClr val="accent1"/>
+          </a:fillRef>
+          <a:effectRef idx="0">
+            <a:schemeClr val="accent1"/>
+          </a:effectRef>
+          <a:fontRef idx="minor">
+            <a:schemeClr val="tx1"/>
+          </a:fontRef>
+        </p:style>
+      </p:cxnSp>
+      <p:pic>
+        <p:nvPicPr>
+          <p:cNvPr id="17" name="Imagem 16">
+            <a:extLst>
+              <a:ext uri="{FF2B5EF4-FFF2-40B4-BE49-F238E27FC236}">
+                <a16:creationId xmlns:a16="http://schemas.microsoft.com/office/drawing/2014/main" id="{387257CD-B2C1-4070-872A-0E7BC489FE9C}"/>
+              </a:ext>
+            </a:extLst>
+          </p:cNvPr>
+          <p:cNvPicPr>
+            <a:picLocks noChangeAspect="1"/>
+          </p:cNvPicPr>
+          <p:nvPr/>
+        </p:nvPicPr>
+        <p:blipFill>
+          <a:blip r:embed="rId6">
+            <a:extLst>
+              <a:ext uri="{28A0092B-C50C-407E-A947-70E740481C1C}">
+                <a14:useLocalDpi xmlns:a14="http://schemas.microsoft.com/office/drawing/2010/main" val="0"/>
+              </a:ext>
+            </a:extLst>
+          </a:blip>
+          <a:stretch>
+            <a:fillRect/>
+          </a:stretch>
+        </p:blipFill>
+        <p:spPr>
+          <a:xfrm>
+            <a:off x="2361681" y="4987387"/>
+            <a:ext cx="3122181" cy="761675"/>
           </a:xfrm>
           <a:prstGeom prst="rect">
             <a:avLst/>
@@ -3660,7 +3381,7 @@
     </p:spTree>
     <p:extLst>
       <p:ext uri="{BB962C8B-B14F-4D97-AF65-F5344CB8AC3E}">
-        <p14:creationId xmlns:p14="http://schemas.microsoft.com/office/powerpoint/2010/main" val="3906474105"/>
+        <p14:creationId xmlns:p14="http://schemas.microsoft.com/office/powerpoint/2010/main" val="1803937878"/>
       </p:ext>
     </p:extLst>
   </p:cSld>
@@ -3704,10 +3425,10 @@
       </p:grpSpPr>
       <p:pic>
         <p:nvPicPr>
-          <p:cNvPr id="7" name="Imagem 6">
+          <p:cNvPr id="6" name="Imagem 5">
             <a:extLst>
               <a:ext uri="{FF2B5EF4-FFF2-40B4-BE49-F238E27FC236}">
-                <a16:creationId xmlns:a16="http://schemas.microsoft.com/office/drawing/2014/main" id="{36F859FA-C17A-45AE-8FFD-3917379ED478}"/>
+                <a16:creationId xmlns:a16="http://schemas.microsoft.com/office/drawing/2014/main" id="{BD3DE711-CD42-45EA-9806-33AD1101BB03}"/>
               </a:ext>
             </a:extLst>
           </p:cNvPr>
@@ -3730,20 +3451,219 @@
         </p:blipFill>
         <p:spPr>
           <a:xfrm>
-            <a:off x="2738899" y="302494"/>
-            <a:ext cx="3312533" cy="1299665"/>
+            <a:off x="4708805" y="2950796"/>
+            <a:ext cx="1986278" cy="1501256"/>
           </a:xfrm>
           <a:prstGeom prst="rect">
             <a:avLst/>
           </a:prstGeom>
         </p:spPr>
       </p:pic>
+      <p:sp>
+        <p:nvSpPr>
+          <p:cNvPr id="2" name="Título 1">
+            <a:extLst>
+              <a:ext uri="{FF2B5EF4-FFF2-40B4-BE49-F238E27FC236}">
+                <a16:creationId xmlns:a16="http://schemas.microsoft.com/office/drawing/2014/main" id="{0B901B2E-79FA-408E-AA83-AE43AF386D86}"/>
+              </a:ext>
+            </a:extLst>
+          </p:cNvPr>
+          <p:cNvSpPr>
+            <a:spLocks noGrp="1"/>
+          </p:cNvSpPr>
+          <p:nvPr>
+            <p:ph type="title"/>
+          </p:nvPr>
+        </p:nvSpPr>
+        <p:spPr>
+          <a:xfrm>
+            <a:off x="467544" y="692696"/>
+            <a:ext cx="8229600" cy="1143000"/>
+          </a:xfrm>
+          <a:noFill/>
+        </p:spPr>
+        <p:txBody>
+          <a:bodyPr vert="horz" lIns="91440" tIns="45720" rIns="91440" bIns="45720" rtlCol="0" anchor="b">
+            <a:normAutofit/>
+          </a:bodyPr>
+          <a:lstStyle/>
+          <a:p>
+            <a:pPr>
+              <a:lnSpc>
+                <a:spcPct val="90000"/>
+              </a:lnSpc>
+            </a:pPr>
+            <a:r>
+              <a:rPr lang="en-US" sz="2900" dirty="0">
+                <a:solidFill>
+                  <a:schemeClr val="tx1">
+                    <a:lumMod val="75000"/>
+                    <a:lumOff val="25000"/>
+                  </a:schemeClr>
+                </a:solidFill>
+              </a:rPr>
+              <a:t>O </a:t>
+            </a:r>
+            <a:r>
+              <a:rPr lang="en-US" sz="2900" dirty="0" err="1">
+                <a:solidFill>
+                  <a:schemeClr val="tx1">
+                    <a:lumMod val="75000"/>
+                    <a:lumOff val="25000"/>
+                  </a:schemeClr>
+                </a:solidFill>
+              </a:rPr>
+              <a:t>setor</a:t>
+            </a:r>
+            <a:r>
+              <a:rPr lang="en-US" sz="2900" dirty="0">
+                <a:solidFill>
+                  <a:schemeClr val="tx1">
+                    <a:lumMod val="75000"/>
+                    <a:lumOff val="25000"/>
+                  </a:schemeClr>
+                </a:solidFill>
+              </a:rPr>
+              <a:t> </a:t>
+            </a:r>
+            <a:r>
+              <a:rPr lang="en-US" sz="2900" dirty="0" err="1">
+                <a:solidFill>
+                  <a:schemeClr val="tx1">
+                    <a:lumMod val="75000"/>
+                    <a:lumOff val="25000"/>
+                  </a:schemeClr>
+                </a:solidFill>
+              </a:rPr>
+              <a:t>automotivo</a:t>
+            </a:r>
+            <a:r>
+              <a:rPr lang="en-US" sz="2900" dirty="0">
+                <a:solidFill>
+                  <a:schemeClr val="tx1">
+                    <a:lumMod val="75000"/>
+                    <a:lumOff val="25000"/>
+                  </a:schemeClr>
+                </a:solidFill>
+              </a:rPr>
+              <a:t> </a:t>
+            </a:r>
+            <a:r>
+              <a:rPr lang="en-US" sz="2900" dirty="0" err="1" smtClean="0">
+                <a:solidFill>
+                  <a:schemeClr val="tx1">
+                    <a:lumMod val="75000"/>
+                    <a:lumOff val="25000"/>
+                  </a:schemeClr>
+                </a:solidFill>
+              </a:rPr>
+              <a:t>gastou</a:t>
+            </a:r>
+            <a:r>
+              <a:rPr lang="en-US" sz="2900" dirty="0" smtClean="0">
+                <a:solidFill>
+                  <a:schemeClr val="tx1">
+                    <a:lumMod val="75000"/>
+                    <a:lumOff val="25000"/>
+                  </a:schemeClr>
+                </a:solidFill>
+              </a:rPr>
+              <a:t> em </a:t>
+            </a:r>
+            <a:r>
+              <a:rPr lang="en-US" sz="2900" dirty="0" err="1" smtClean="0">
+                <a:solidFill>
+                  <a:schemeClr val="tx1">
+                    <a:lumMod val="75000"/>
+                    <a:lumOff val="25000"/>
+                  </a:schemeClr>
+                </a:solidFill>
+              </a:rPr>
+              <a:t>publicidade</a:t>
+            </a:r>
+            <a:r>
+              <a:rPr lang="en-US" sz="2900" dirty="0" smtClean="0">
+                <a:solidFill>
+                  <a:schemeClr val="tx1">
+                    <a:lumMod val="75000"/>
+                    <a:lumOff val="25000"/>
+                  </a:schemeClr>
+                </a:solidFill>
+              </a:rPr>
+              <a:t> </a:t>
+            </a:r>
+            <a:r>
+              <a:rPr lang="en-US" sz="2900" dirty="0">
+                <a:solidFill>
+                  <a:schemeClr val="tx1">
+                    <a:lumMod val="75000"/>
+                    <a:lumOff val="25000"/>
+                  </a:schemeClr>
+                </a:solidFill>
+              </a:rPr>
+              <a:t>R</a:t>
+            </a:r>
+            <a:r>
+              <a:rPr lang="en-US" sz="2900" dirty="0" smtClean="0">
+                <a:solidFill>
+                  <a:schemeClr val="tx1">
+                    <a:lumMod val="75000"/>
+                    <a:lumOff val="25000"/>
+                  </a:schemeClr>
+                </a:solidFill>
+              </a:rPr>
+              <a:t>$ 6,9 </a:t>
+            </a:r>
+            <a:r>
+              <a:rPr lang="en-US" sz="2900" dirty="0" err="1">
+                <a:solidFill>
+                  <a:schemeClr val="tx1">
+                    <a:lumMod val="75000"/>
+                    <a:lumOff val="25000"/>
+                  </a:schemeClr>
+                </a:solidFill>
+              </a:rPr>
+              <a:t>Bilhões</a:t>
+            </a:r>
+            <a:r>
+              <a:rPr lang="en-US" sz="2900" dirty="0">
+                <a:solidFill>
+                  <a:schemeClr val="tx1">
+                    <a:lumMod val="75000"/>
+                    <a:lumOff val="25000"/>
+                  </a:schemeClr>
+                </a:solidFill>
+              </a:rPr>
+              <a:t> em </a:t>
+            </a:r>
+            <a:r>
+              <a:rPr lang="en-US" sz="2900" dirty="0" smtClean="0">
+                <a:solidFill>
+                  <a:schemeClr val="tx1">
+                    <a:lumMod val="75000"/>
+                    <a:lumOff val="25000"/>
+                  </a:schemeClr>
+                </a:solidFill>
+              </a:rPr>
+              <a:t>2013. </a:t>
+            </a:r>
+            <a:endParaRPr lang="en-US" sz="2900" dirty="0">
+              <a:solidFill>
+                <a:schemeClr val="tx1">
+                  <a:lumMod val="75000"/>
+                  <a:lumOff val="25000"/>
+                </a:schemeClr>
+              </a:solidFill>
+            </a:endParaRPr>
+          </a:p>
+        </p:txBody>
+      </p:sp>
       <p:pic>
         <p:nvPicPr>
-          <p:cNvPr id="9" name="Imagem 8">
+          <p:cNvPr id="4" name="Imagem 3">
             <a:extLst>
               <a:ext uri="{FF2B5EF4-FFF2-40B4-BE49-F238E27FC236}">
-                <a16:creationId xmlns:a16="http://schemas.microsoft.com/office/drawing/2014/main" id="{F71EA765-6142-4399-BA44-60CBA14F2C78}"/>
+                <a16:creationId xmlns:a16="http://schemas.microsoft.com/office/drawing/2014/main" id="{0442D338-DDF0-4C2D-BF97-E46E9910E28A}"/>
               </a:ext>
             </a:extLst>
           </p:cNvPr>
@@ -3766,250 +3686,20 @@
         </p:blipFill>
         <p:spPr>
           <a:xfrm>
-            <a:off x="5740518" y="3222960"/>
-            <a:ext cx="3312534" cy="2690484"/>
+            <a:off x="256191" y="3349876"/>
+            <a:ext cx="1994604" cy="703097"/>
           </a:xfrm>
           <a:prstGeom prst="rect">
             <a:avLst/>
           </a:prstGeom>
         </p:spPr>
       </p:pic>
-      <p:sp>
-        <p:nvSpPr>
-          <p:cNvPr id="4" name="Título 1"/>
-          <p:cNvSpPr>
-            <a:spLocks noGrp="1"/>
-          </p:cNvSpPr>
-          <p:nvPr>
-            <p:ph type="title"/>
-          </p:nvPr>
-        </p:nvSpPr>
-        <p:spPr>
-          <a:xfrm>
-            <a:off x="115351" y="597884"/>
-            <a:ext cx="3113556" cy="3970318"/>
-          </a:xfrm>
-        </p:spPr>
-        <p:txBody>
-          <a:bodyPr vert="horz" lIns="91440" tIns="45720" rIns="91440" bIns="45720" rtlCol="0" anchor="b">
-            <a:normAutofit/>
-          </a:bodyPr>
-          <a:lstStyle/>
-          <a:p>
-            <a:pPr algn="l">
-              <a:lnSpc>
-                <a:spcPct val="90000"/>
-              </a:lnSpc>
-            </a:pPr>
-            <a:r>
-              <a:rPr lang="en-US" sz="2000" b="1" kern="1200" dirty="0">
-                <a:solidFill>
-                  <a:schemeClr val="tx1"/>
-                </a:solidFill>
-                <a:latin typeface="Arial" panose="020B0604020202020204" pitchFamily="34" charset="0"/>
-                <a:cs typeface="Arial" panose="020B0604020202020204" pitchFamily="34" charset="0"/>
-              </a:rPr>
-              <a:t>Possíveis clientes</a:t>
-            </a:r>
-            <a:r>
-              <a:rPr lang="en-US" sz="2000" b="1" kern="1200" dirty="0" smtClean="0">
-                <a:solidFill>
-                  <a:schemeClr val="tx1"/>
-                </a:solidFill>
-                <a:latin typeface="Arial" panose="020B0604020202020204" pitchFamily="34" charset="0"/>
-                <a:cs typeface="Arial" panose="020B0604020202020204" pitchFamily="34" charset="0"/>
-              </a:rPr>
-              <a:t>:</a:t>
-            </a:r>
-            <a:r>
-              <a:rPr lang="en-US" sz="2000" kern="1200" dirty="0" smtClean="0">
-                <a:solidFill>
-                  <a:schemeClr val="tx1"/>
-                </a:solidFill>
-                <a:latin typeface="Calibri Light" panose="020F0302020204030204" pitchFamily="34" charset="0"/>
-                <a:cs typeface="Calibri Light" panose="020F0302020204030204" pitchFamily="34" charset="0"/>
-              </a:rPr>
-              <a:t/>
-            </a:r>
-            <a:br>
-              <a:rPr lang="en-US" sz="2000" kern="1200" dirty="0" smtClean="0">
-                <a:solidFill>
-                  <a:schemeClr val="tx1"/>
-                </a:solidFill>
-                <a:latin typeface="Calibri Light" panose="020F0302020204030204" pitchFamily="34" charset="0"/>
-                <a:cs typeface="Calibri Light" panose="020F0302020204030204" pitchFamily="34" charset="0"/>
-              </a:rPr>
-            </a:br>
-            <a:r>
-              <a:rPr lang="en-US" sz="2000" dirty="0">
-                <a:latin typeface="Calibri Light" panose="020F0302020204030204" pitchFamily="34" charset="0"/>
-                <a:cs typeface="Calibri Light" panose="020F0302020204030204" pitchFamily="34" charset="0"/>
-              </a:rPr>
-              <a:t/>
-            </a:r>
-            <a:br>
-              <a:rPr lang="en-US" sz="2000" dirty="0">
-                <a:latin typeface="Calibri Light" panose="020F0302020204030204" pitchFamily="34" charset="0"/>
-                <a:cs typeface="Calibri Light" panose="020F0302020204030204" pitchFamily="34" charset="0"/>
-              </a:rPr>
-            </a:br>
-            <a:r>
-              <a:rPr lang="en-US" sz="2000" dirty="0" smtClean="0">
-                <a:latin typeface="Calibri Light" panose="020F0302020204030204" pitchFamily="34" charset="0"/>
-                <a:cs typeface="Calibri Light" panose="020F0302020204030204" pitchFamily="34" charset="0"/>
-              </a:rPr>
-              <a:t>- Seguradoras;</a:t>
-            </a:r>
-            <a:r>
-              <a:rPr lang="en-US" sz="2000" dirty="0">
-                <a:latin typeface="Calibri Light" panose="020F0302020204030204" pitchFamily="34" charset="0"/>
-                <a:cs typeface="Calibri Light" panose="020F0302020204030204" pitchFamily="34" charset="0"/>
-              </a:rPr>
-              <a:t/>
-            </a:r>
-            <a:br>
-              <a:rPr lang="en-US" sz="2000" dirty="0">
-                <a:latin typeface="Calibri Light" panose="020F0302020204030204" pitchFamily="34" charset="0"/>
-                <a:cs typeface="Calibri Light" panose="020F0302020204030204" pitchFamily="34" charset="0"/>
-              </a:rPr>
-            </a:br>
-            <a:r>
-              <a:rPr lang="en-US" sz="2000" dirty="0" smtClean="0">
-                <a:latin typeface="Calibri Light" panose="020F0302020204030204" pitchFamily="34" charset="0"/>
-                <a:cs typeface="Calibri Light" panose="020F0302020204030204" pitchFamily="34" charset="0"/>
-              </a:rPr>
-              <a:t>- Montadoras </a:t>
-            </a:r>
-            <a:r>
-              <a:rPr lang="en-US" sz="2000" dirty="0">
-                <a:latin typeface="Calibri Light" panose="020F0302020204030204" pitchFamily="34" charset="0"/>
-                <a:cs typeface="Calibri Light" panose="020F0302020204030204" pitchFamily="34" charset="0"/>
-              </a:rPr>
-              <a:t>de veículos;</a:t>
-            </a:r>
-            <a:br>
-              <a:rPr lang="en-US" sz="2000" dirty="0">
-                <a:latin typeface="Calibri Light" panose="020F0302020204030204" pitchFamily="34" charset="0"/>
-                <a:cs typeface="Calibri Light" panose="020F0302020204030204" pitchFamily="34" charset="0"/>
-              </a:rPr>
-            </a:br>
-            <a:r>
-              <a:rPr lang="en-US" sz="2000" dirty="0" smtClean="0">
-                <a:latin typeface="Calibri Light" panose="020F0302020204030204" pitchFamily="34" charset="0"/>
-                <a:cs typeface="Calibri Light" panose="020F0302020204030204" pitchFamily="34" charset="0"/>
-              </a:rPr>
-              <a:t>- Fabricantes </a:t>
-            </a:r>
-            <a:r>
-              <a:rPr lang="en-US" sz="2000" dirty="0">
-                <a:latin typeface="Calibri Light" panose="020F0302020204030204" pitchFamily="34" charset="0"/>
-                <a:cs typeface="Calibri Light" panose="020F0302020204030204" pitchFamily="34" charset="0"/>
-              </a:rPr>
-              <a:t>de pneus;</a:t>
-            </a:r>
-            <a:br>
-              <a:rPr lang="en-US" sz="2000" dirty="0">
-                <a:latin typeface="Calibri Light" panose="020F0302020204030204" pitchFamily="34" charset="0"/>
-                <a:cs typeface="Calibri Light" panose="020F0302020204030204" pitchFamily="34" charset="0"/>
-              </a:rPr>
-            </a:br>
-            <a:r>
-              <a:rPr lang="en-US" sz="2000" dirty="0" smtClean="0">
-                <a:latin typeface="Calibri Light" panose="020F0302020204030204" pitchFamily="34" charset="0"/>
-                <a:cs typeface="Calibri Light" panose="020F0302020204030204" pitchFamily="34" charset="0"/>
-              </a:rPr>
-              <a:t>- Fabricantes </a:t>
-            </a:r>
-            <a:r>
-              <a:rPr lang="en-US" sz="2000" dirty="0">
-                <a:latin typeface="Calibri Light" panose="020F0302020204030204" pitchFamily="34" charset="0"/>
-                <a:cs typeface="Calibri Light" panose="020F0302020204030204" pitchFamily="34" charset="0"/>
-              </a:rPr>
-              <a:t>de peças e acessórios;</a:t>
-            </a:r>
-            <a:br>
-              <a:rPr lang="en-US" sz="2000" dirty="0">
-                <a:latin typeface="Calibri Light" panose="020F0302020204030204" pitchFamily="34" charset="0"/>
-                <a:cs typeface="Calibri Light" panose="020F0302020204030204" pitchFamily="34" charset="0"/>
-              </a:rPr>
-            </a:br>
-            <a:r>
-              <a:rPr lang="en-US" sz="2000" dirty="0" smtClean="0">
-                <a:latin typeface="Calibri Light" panose="020F0302020204030204" pitchFamily="34" charset="0"/>
-                <a:cs typeface="Calibri Light" panose="020F0302020204030204" pitchFamily="34" charset="0"/>
-              </a:rPr>
-              <a:t>- Oficinas </a:t>
-            </a:r>
-            <a:r>
-              <a:rPr lang="en-US" sz="2000" dirty="0">
-                <a:latin typeface="Calibri Light" panose="020F0302020204030204" pitchFamily="34" charset="0"/>
-                <a:cs typeface="Calibri Light" panose="020F0302020204030204" pitchFamily="34" charset="0"/>
-              </a:rPr>
-              <a:t>mecanicas; </a:t>
-            </a:r>
-            <a:br>
-              <a:rPr lang="en-US" sz="2000" dirty="0">
-                <a:latin typeface="Calibri Light" panose="020F0302020204030204" pitchFamily="34" charset="0"/>
-                <a:cs typeface="Calibri Light" panose="020F0302020204030204" pitchFamily="34" charset="0"/>
-              </a:rPr>
-            </a:br>
-            <a:r>
-              <a:rPr lang="en-US" sz="2000" dirty="0" smtClean="0">
-                <a:latin typeface="Calibri Light" panose="020F0302020204030204" pitchFamily="34" charset="0"/>
-                <a:cs typeface="Calibri Light" panose="020F0302020204030204" pitchFamily="34" charset="0"/>
-              </a:rPr>
-              <a:t>- Fabricantes </a:t>
-            </a:r>
-            <a:r>
-              <a:rPr lang="en-US" sz="2000" dirty="0">
-                <a:latin typeface="Calibri Light" panose="020F0302020204030204" pitchFamily="34" charset="0"/>
-                <a:cs typeface="Calibri Light" panose="020F0302020204030204" pitchFamily="34" charset="0"/>
-              </a:rPr>
-              <a:t>de lubrificantes, ceras e afins.</a:t>
-            </a:r>
-            <a:r>
-              <a:rPr lang="en-US" sz="2000" dirty="0">
-                <a:latin typeface="Century Gothic" panose="020B0502020202020204" pitchFamily="34" charset="0"/>
-              </a:rPr>
-              <a:t/>
-            </a:r>
-            <a:br>
-              <a:rPr lang="en-US" sz="2000" dirty="0">
-                <a:latin typeface="Century Gothic" panose="020B0502020202020204" pitchFamily="34" charset="0"/>
-              </a:rPr>
-            </a:br>
-            <a:r>
-              <a:rPr lang="en-US" sz="2000" kern="1200" dirty="0">
-                <a:solidFill>
-                  <a:schemeClr val="tx1"/>
-                </a:solidFill>
-                <a:latin typeface="Century Gothic" panose="020B0502020202020204" pitchFamily="34" charset="0"/>
-              </a:rPr>
-              <a:t/>
-            </a:r>
-            <a:br>
-              <a:rPr lang="en-US" sz="2000" kern="1200" dirty="0">
-                <a:solidFill>
-                  <a:schemeClr val="tx1"/>
-                </a:solidFill>
-                <a:latin typeface="Century Gothic" panose="020B0502020202020204" pitchFamily="34" charset="0"/>
-              </a:rPr>
-            </a:br>
-            <a:endParaRPr lang="en-US" sz="2000" kern="1200" dirty="0">
-              <a:solidFill>
-                <a:schemeClr val="tx1"/>
-              </a:solidFill>
-              <a:latin typeface="Century Gothic" panose="020B0502020202020204" pitchFamily="34" charset="0"/>
-            </a:endParaRPr>
-          </a:p>
-        </p:txBody>
-      </p:sp>
       <p:pic>
         <p:nvPicPr>
-          <p:cNvPr id="13" name="Imagem 12">
+          <p:cNvPr id="8" name="Imagem 7">
             <a:extLst>
               <a:ext uri="{FF2B5EF4-FFF2-40B4-BE49-F238E27FC236}">
-                <a16:creationId xmlns:a16="http://schemas.microsoft.com/office/drawing/2014/main" id="{35E786EB-9196-4DA7-822B-32B8576857D8}"/>
+                <a16:creationId xmlns:a16="http://schemas.microsoft.com/office/drawing/2014/main" id="{8DBC8C24-B90D-4190-9A00-CF65C519FC49}"/>
               </a:ext>
             </a:extLst>
           </p:cNvPr>
@@ -4032,8 +3722,8 @@
         </p:blipFill>
         <p:spPr>
           <a:xfrm>
-            <a:off x="3731520" y="2848853"/>
-            <a:ext cx="1642096" cy="1092740"/>
+            <a:off x="2483768" y="2708920"/>
+            <a:ext cx="1985008" cy="1985008"/>
           </a:xfrm>
           <a:prstGeom prst="rect">
             <a:avLst/>
@@ -4042,10 +3732,10 @@
       </p:pic>
       <p:pic>
         <p:nvPicPr>
-          <p:cNvPr id="5" name="Imagem 4">
+          <p:cNvPr id="10" name="Imagem 9">
             <a:extLst>
               <a:ext uri="{FF2B5EF4-FFF2-40B4-BE49-F238E27FC236}">
-                <a16:creationId xmlns:a16="http://schemas.microsoft.com/office/drawing/2014/main" id="{70757C8B-31DC-48D2-8B19-5281436B0BC8}"/>
+                <a16:creationId xmlns:a16="http://schemas.microsoft.com/office/drawing/2014/main" id="{4B3FB65A-058E-4FE5-9937-F78C3269C1AD}"/>
               </a:ext>
             </a:extLst>
           </p:cNvPr>
@@ -4068,264 +3758,8 @@
         </p:blipFill>
         <p:spPr>
           <a:xfrm>
-            <a:off x="5909310" y="1022504"/>
-            <a:ext cx="2997729" cy="1338271"/>
-          </a:xfrm>
-          <a:prstGeom prst="rect">
-            <a:avLst/>
-          </a:prstGeom>
-        </p:spPr>
-      </p:pic>
-      <p:cxnSp>
-        <p:nvCxnSpPr>
-          <p:cNvPr id="30" name="Straight Connector 17">
-            <a:extLst>
-              <a:ext uri="{FF2B5EF4-FFF2-40B4-BE49-F238E27FC236}">
-                <a16:creationId xmlns:a16="http://schemas.microsoft.com/office/drawing/2014/main" id="{DC034BB4-8B50-4484-85C4-0CE4699284D7}"/>
-              </a:ext>
-              <a:ext uri="{C183D7F6-B498-43B3-948B-1728B52AA6E4}">
-                <adec:decorative xmlns="" xmlns:adec="http://schemas.microsoft.com/office/drawing/2017/decorative" val="1"/>
-              </a:ext>
-            </a:extLst>
-          </p:cNvPr>
-          <p:cNvCxnSpPr>
-            <a:cxnSpLocks noGrp="1" noRot="1" noChangeAspect="1" noMove="1" noResize="1" noEditPoints="1" noAdjustHandles="1" noChangeArrowheads="1" noChangeShapeType="1"/>
-          </p:cNvCxnSpPr>
-          <p:nvPr>
-            <p:extLst>
-              <p:ext uri="{386F3935-93C4-4BCD-93E2-E3B085C9AB24}">
-                <p16:designElem xmlns:p16="http://schemas.microsoft.com/office/powerpoint/2015/main" val="1"/>
-              </p:ext>
-            </p:extLst>
-          </p:nvPr>
-        </p:nvCxnSpPr>
-        <p:spPr>
-          <a:xfrm>
-            <a:off x="5647996" y="0"/>
-            <a:ext cx="0" cy="6858000"/>
-          </a:xfrm>
-          <a:prstGeom prst="line">
-            <a:avLst/>
-          </a:prstGeom>
-          <a:ln w="38100" cap="sq">
-            <a:solidFill>
-              <a:schemeClr val="tx1">
-                <a:lumMod val="75000"/>
-                <a:lumOff val="25000"/>
-              </a:schemeClr>
-            </a:solidFill>
-          </a:ln>
-        </p:spPr>
-        <p:style>
-          <a:lnRef idx="1">
-            <a:schemeClr val="accent1"/>
-          </a:lnRef>
-          <a:fillRef idx="0">
-            <a:schemeClr val="accent1"/>
-          </a:fillRef>
-          <a:effectRef idx="0">
-            <a:schemeClr val="accent1"/>
-          </a:effectRef>
-          <a:fontRef idx="minor">
-            <a:schemeClr val="tx1"/>
-          </a:fontRef>
-        </p:style>
-      </p:cxnSp>
-      <p:cxnSp>
-        <p:nvCxnSpPr>
-          <p:cNvPr id="31" name="Straight Connector 19">
-            <a:extLst>
-              <a:ext uri="{FF2B5EF4-FFF2-40B4-BE49-F238E27FC236}">
-                <a16:creationId xmlns:a16="http://schemas.microsoft.com/office/drawing/2014/main" id="{81B200F7-B57A-4824-BB91-B6624450A5AC}"/>
-              </a:ext>
-              <a:ext uri="{C183D7F6-B498-43B3-948B-1728B52AA6E4}">
-                <adec:decorative xmlns="" xmlns:adec="http://schemas.microsoft.com/office/drawing/2017/decorative" val="1"/>
-              </a:ext>
-            </a:extLst>
-          </p:cNvPr>
-          <p:cNvCxnSpPr>
-            <a:cxnSpLocks noGrp="1" noRot="1" noChangeAspect="1" noMove="1" noResize="1" noEditPoints="1" noAdjustHandles="1" noChangeArrowheads="1" noChangeShapeType="1"/>
-          </p:cNvCxnSpPr>
-          <p:nvPr>
-            <p:extLst>
-              <p:ext uri="{386F3935-93C4-4BCD-93E2-E3B085C9AB24}">
-                <p16:designElem xmlns:p16="http://schemas.microsoft.com/office/powerpoint/2015/main" val="1"/>
-              </p:ext>
-            </p:extLst>
-          </p:nvPr>
-        </p:nvCxnSpPr>
-        <p:spPr>
-          <a:xfrm>
-            <a:off x="3490220" y="2228770"/>
-            <a:ext cx="2157776" cy="0"/>
-          </a:xfrm>
-          <a:prstGeom prst="line">
-            <a:avLst/>
-          </a:prstGeom>
-          <a:ln w="38100">
-            <a:solidFill>
-              <a:schemeClr val="tx1">
-                <a:lumMod val="75000"/>
-                <a:lumOff val="25000"/>
-              </a:schemeClr>
-            </a:solidFill>
-          </a:ln>
-        </p:spPr>
-        <p:style>
-          <a:lnRef idx="1">
-            <a:schemeClr val="accent1"/>
-          </a:lnRef>
-          <a:fillRef idx="0">
-            <a:schemeClr val="accent1"/>
-          </a:fillRef>
-          <a:effectRef idx="0">
-            <a:schemeClr val="accent1"/>
-          </a:effectRef>
-          <a:fontRef idx="minor">
-            <a:schemeClr val="tx1"/>
-          </a:fontRef>
-        </p:style>
-      </p:cxnSp>
-      <p:cxnSp>
-        <p:nvCxnSpPr>
-          <p:cNvPr id="32" name="Straight Connector 21">
-            <a:extLst>
-              <a:ext uri="{FF2B5EF4-FFF2-40B4-BE49-F238E27FC236}">
-                <a16:creationId xmlns:a16="http://schemas.microsoft.com/office/drawing/2014/main" id="{1902062F-7F47-41E5-8574-2D1492D58ED3}"/>
-              </a:ext>
-              <a:ext uri="{C183D7F6-B498-43B3-948B-1728B52AA6E4}">
-                <adec:decorative xmlns="" xmlns:adec="http://schemas.microsoft.com/office/drawing/2017/decorative" val="1"/>
-              </a:ext>
-            </a:extLst>
-          </p:cNvPr>
-          <p:cNvCxnSpPr>
-            <a:cxnSpLocks noGrp="1" noRot="1" noChangeAspect="1" noMove="1" noResize="1" noEditPoints="1" noAdjustHandles="1" noChangeArrowheads="1" noChangeShapeType="1"/>
-          </p:cNvCxnSpPr>
-          <p:nvPr>
-            <p:extLst>
-              <p:ext uri="{386F3935-93C4-4BCD-93E2-E3B085C9AB24}">
-                <p16:designElem xmlns:p16="http://schemas.microsoft.com/office/powerpoint/2015/main" val="1"/>
-              </p:ext>
-            </p:extLst>
-          </p:nvPr>
-        </p:nvCxnSpPr>
-        <p:spPr>
-          <a:xfrm>
-            <a:off x="5647995" y="3429000"/>
-            <a:ext cx="3497580" cy="0"/>
-          </a:xfrm>
-          <a:prstGeom prst="line">
-            <a:avLst/>
-          </a:prstGeom>
-          <a:ln w="38100">
-            <a:solidFill>
-              <a:schemeClr val="tx1">
-                <a:lumMod val="75000"/>
-                <a:lumOff val="25000"/>
-              </a:schemeClr>
-            </a:solidFill>
-          </a:ln>
-        </p:spPr>
-        <p:style>
-          <a:lnRef idx="1">
-            <a:schemeClr val="accent1"/>
-          </a:lnRef>
-          <a:fillRef idx="0">
-            <a:schemeClr val="accent1"/>
-          </a:fillRef>
-          <a:effectRef idx="0">
-            <a:schemeClr val="accent1"/>
-          </a:effectRef>
-          <a:fontRef idx="minor">
-            <a:schemeClr val="tx1"/>
-          </a:fontRef>
-        </p:style>
-      </p:cxnSp>
-      <p:cxnSp>
-        <p:nvCxnSpPr>
-          <p:cNvPr id="33" name="Straight Connector 23">
-            <a:extLst>
-              <a:ext uri="{FF2B5EF4-FFF2-40B4-BE49-F238E27FC236}">
-                <a16:creationId xmlns:a16="http://schemas.microsoft.com/office/drawing/2014/main" id="{FA92245C-961F-47D5-9691-272D28692D45}"/>
-              </a:ext>
-              <a:ext uri="{C183D7F6-B498-43B3-948B-1728B52AA6E4}">
-                <adec:decorative xmlns="" xmlns:adec="http://schemas.microsoft.com/office/drawing/2017/decorative" val="1"/>
-              </a:ext>
-            </a:extLst>
-          </p:cNvPr>
-          <p:cNvCxnSpPr>
-            <a:cxnSpLocks noGrp="1" noRot="1" noChangeAspect="1" noMove="1" noResize="1" noEditPoints="1" noAdjustHandles="1" noChangeArrowheads="1" noChangeShapeType="1"/>
-          </p:cNvCxnSpPr>
-          <p:nvPr>
-            <p:extLst>
-              <p:ext uri="{386F3935-93C4-4BCD-93E2-E3B085C9AB24}">
-                <p16:designElem xmlns:p16="http://schemas.microsoft.com/office/powerpoint/2015/main" val="1"/>
-              </p:ext>
-            </p:extLst>
-          </p:nvPr>
-        </p:nvCxnSpPr>
-        <p:spPr>
-          <a:xfrm>
-            <a:off x="3490220" y="4568202"/>
-            <a:ext cx="2157776" cy="0"/>
-          </a:xfrm>
-          <a:prstGeom prst="line">
-            <a:avLst/>
-          </a:prstGeom>
-          <a:ln w="38100">
-            <a:solidFill>
-              <a:schemeClr val="tx1">
-                <a:lumMod val="75000"/>
-                <a:lumOff val="25000"/>
-              </a:schemeClr>
-            </a:solidFill>
-          </a:ln>
-        </p:spPr>
-        <p:style>
-          <a:lnRef idx="1">
-            <a:schemeClr val="accent1"/>
-          </a:lnRef>
-          <a:fillRef idx="0">
-            <a:schemeClr val="accent1"/>
-          </a:fillRef>
-          <a:effectRef idx="0">
-            <a:schemeClr val="accent1"/>
-          </a:effectRef>
-          <a:fontRef idx="minor">
-            <a:schemeClr val="tx1"/>
-          </a:fontRef>
-        </p:style>
-      </p:cxnSp>
-      <p:pic>
-        <p:nvPicPr>
-          <p:cNvPr id="17" name="Imagem 16">
-            <a:extLst>
-              <a:ext uri="{FF2B5EF4-FFF2-40B4-BE49-F238E27FC236}">
-                <a16:creationId xmlns:a16="http://schemas.microsoft.com/office/drawing/2014/main" id="{387257CD-B2C1-4070-872A-0E7BC489FE9C}"/>
-              </a:ext>
-            </a:extLst>
-          </p:cNvPr>
-          <p:cNvPicPr>
-            <a:picLocks noChangeAspect="1"/>
-          </p:cNvPicPr>
-          <p:nvPr/>
-        </p:nvPicPr>
-        <p:blipFill>
-          <a:blip r:embed="rId6">
-            <a:extLst>
-              <a:ext uri="{28A0092B-C50C-407E-A947-70E740481C1C}">
-                <a14:useLocalDpi xmlns:a14="http://schemas.microsoft.com/office/drawing/2010/main" val="0"/>
-              </a:ext>
-            </a:extLst>
-          </a:blip>
-          <a:stretch>
-            <a:fillRect/>
-          </a:stretch>
-        </p:blipFill>
-        <p:spPr>
-          <a:xfrm>
-            <a:off x="2361681" y="4987387"/>
-            <a:ext cx="3122181" cy="761675"/>
+            <a:off x="6935112" y="3227169"/>
+            <a:ext cx="1986279" cy="993139"/>
           </a:xfrm>
           <a:prstGeom prst="rect">
             <a:avLst/>
@@ -4335,7 +3769,7 @@
     </p:spTree>
     <p:extLst>
       <p:ext uri="{BB962C8B-B14F-4D97-AF65-F5344CB8AC3E}">
-        <p14:creationId xmlns:p14="http://schemas.microsoft.com/office/powerpoint/2010/main" val="1803937878"/>
+        <p14:creationId xmlns:p14="http://schemas.microsoft.com/office/powerpoint/2010/main" val="3906474105"/>
       </p:ext>
     </p:extLst>
   </p:cSld>
@@ -4369,46 +3803,266 @@
           <a:chExt cx="0" cy="0"/>
         </a:xfrm>
       </p:grpSpPr>
+      <p:sp>
+        <p:nvSpPr>
+          <p:cNvPr id="2" name="Título 1"/>
+          <p:cNvSpPr>
+            <a:spLocks noGrp="1"/>
+          </p:cNvSpPr>
+          <p:nvPr>
+            <p:ph type="title"/>
+          </p:nvPr>
+        </p:nvSpPr>
+        <p:spPr>
+          <a:xfrm>
+            <a:off x="462401" y="3140968"/>
+            <a:ext cx="8229600" cy="1143000"/>
+          </a:xfrm>
+        </p:spPr>
+        <p:txBody>
+          <a:bodyPr>
+            <a:normAutofit fontScale="90000"/>
+          </a:bodyPr>
+          <a:lstStyle/>
+          <a:p>
+            <a:r>
+              <a:rPr lang="pt-BR" sz="1800" dirty="0" err="1" smtClean="0">
+                <a:hlinkClick r:id="rId2"/>
+              </a:rPr>
+              <a:t>AutomotiveBusiness</a:t>
+            </a:r>
+            <a:r>
+              <a:rPr lang="pt-BR" sz="1800" dirty="0" smtClean="0">
+                <a:hlinkClick r:id="rId2"/>
+              </a:rPr>
+              <a:t> - Investimentos em publicidade</a:t>
+            </a:r>
+            <a:r>
+              <a:rPr lang="pt-BR" sz="1800" dirty="0" smtClean="0"/>
+              <a:t/>
+            </a:r>
+            <a:br>
+              <a:rPr lang="pt-BR" sz="1800" dirty="0" smtClean="0"/>
+            </a:br>
+            <a:r>
+              <a:rPr lang="pt-BR" sz="1800" dirty="0"/>
+              <a:t/>
+            </a:r>
+            <a:br>
+              <a:rPr lang="pt-BR" sz="1800" dirty="0"/>
+            </a:br>
+            <a:r>
+              <a:rPr lang="pt-BR" sz="1800" dirty="0" err="1" smtClean="0">
+                <a:hlinkClick r:id="rId3"/>
+              </a:rPr>
+              <a:t>AutomotiveBusiness</a:t>
+            </a:r>
+            <a:r>
+              <a:rPr lang="pt-BR" sz="1800" dirty="0" smtClean="0">
+                <a:hlinkClick r:id="rId3"/>
+              </a:rPr>
+              <a:t> - Empresa que mais investe em publicidade</a:t>
+            </a:r>
+            <a:r>
+              <a:rPr lang="pt-BR" sz="1800" dirty="0" smtClean="0"/>
+              <a:t/>
+            </a:r>
+            <a:br>
+              <a:rPr lang="pt-BR" sz="1800" dirty="0" smtClean="0"/>
+            </a:br>
+            <a:r>
+              <a:rPr lang="pt-BR" sz="1800" dirty="0"/>
+              <a:t/>
+            </a:r>
+            <a:br>
+              <a:rPr lang="pt-BR" sz="1800" dirty="0"/>
+            </a:br>
+            <a:r>
+              <a:rPr lang="pt-BR" sz="1800" dirty="0" err="1" smtClean="0">
+                <a:hlinkClick r:id="rId4"/>
+              </a:rPr>
+              <a:t>AltGrupo</a:t>
+            </a:r>
+            <a:r>
+              <a:rPr lang="pt-BR" sz="1800" dirty="0" smtClean="0">
+                <a:hlinkClick r:id="rId4"/>
+              </a:rPr>
+              <a:t> - Mercado automotivo dados/</a:t>
+            </a:r>
+            <a:r>
+              <a:rPr lang="pt-BR" sz="1800" dirty="0" smtClean="0"/>
+              <a:t/>
+            </a:r>
+            <a:br>
+              <a:rPr lang="pt-BR" sz="1800" dirty="0" smtClean="0"/>
+            </a:br>
+            <a:r>
+              <a:rPr lang="pt-BR" sz="1800" dirty="0"/>
+              <a:t/>
+            </a:r>
+            <a:br>
+              <a:rPr lang="pt-BR" sz="1800" dirty="0"/>
+            </a:br>
+            <a:r>
+              <a:rPr lang="pt-BR" sz="1800" dirty="0" err="1" smtClean="0">
+                <a:hlinkClick r:id="rId5"/>
+              </a:rPr>
+              <a:t>Estadao</a:t>
+            </a:r>
+            <a:r>
+              <a:rPr lang="pt-BR" sz="1800" dirty="0" smtClean="0">
+                <a:hlinkClick r:id="rId5"/>
+              </a:rPr>
+              <a:t> Esportes - Allianz fecha acordo de </a:t>
+            </a:r>
+            <a:r>
+              <a:rPr lang="pt-BR" sz="1800" dirty="0" err="1" smtClean="0">
+                <a:hlinkClick r:id="rId5"/>
+              </a:rPr>
+              <a:t>naming</a:t>
+            </a:r>
+            <a:r>
+              <a:rPr lang="pt-BR" sz="1800" dirty="0" smtClean="0">
+                <a:hlinkClick r:id="rId5"/>
+              </a:rPr>
+              <a:t> </a:t>
+            </a:r>
+            <a:r>
+              <a:rPr lang="pt-BR" sz="1800" dirty="0" err="1" smtClean="0">
+                <a:hlinkClick r:id="rId5"/>
+              </a:rPr>
+              <a:t>rights</a:t>
+            </a:r>
+            <a:r>
+              <a:rPr lang="pt-BR" sz="1800" dirty="0" smtClean="0">
+                <a:hlinkClick r:id="rId5"/>
+              </a:rPr>
+              <a:t> da arena palestra</a:t>
+            </a:r>
+            <a:r>
+              <a:rPr lang="pt-BR" sz="1800" dirty="0" smtClean="0"/>
+              <a:t/>
+            </a:r>
+            <a:br>
+              <a:rPr lang="pt-BR" sz="1800" dirty="0" smtClean="0"/>
+            </a:br>
+            <a:r>
+              <a:rPr lang="pt-BR" sz="1800" dirty="0"/>
+              <a:t/>
+            </a:r>
+            <a:br>
+              <a:rPr lang="pt-BR" sz="1800" dirty="0"/>
+            </a:br>
+            <a:r>
+              <a:rPr lang="pt-BR" sz="1800" dirty="0" smtClean="0">
+                <a:hlinkClick r:id="rId6"/>
+              </a:rPr>
+              <a:t>Época Negócios - Brasil tem 230 milhões de smartphones em uso</a:t>
+            </a:r>
+            <a:endParaRPr lang="pt-BR" sz="1800" dirty="0"/>
+          </a:p>
+        </p:txBody>
+      </p:sp>
       <p:pic>
         <p:nvPicPr>
-          <p:cNvPr id="4" name="Imagem 3">
-            <a:extLst>
-              <a:ext uri="{FF2B5EF4-FFF2-40B4-BE49-F238E27FC236}">
-                <a16:creationId xmlns:a16="http://schemas.microsoft.com/office/drawing/2014/main" id="{4F6C6ABF-FDFF-4474-AA78-71FA0ABA502D}"/>
-              </a:ext>
-            </a:extLst>
-          </p:cNvPr>
+          <p:cNvPr id="3" name="Picture 5" descr="D:\ATA 2015\Logos 2015\Bebedouro\Logo_Etec branco.png"/>
           <p:cNvPicPr>
-            <a:picLocks noChangeAspect="1"/>
+            <a:picLocks noChangeAspect="1" noChangeArrowheads="1"/>
           </p:cNvPicPr>
           <p:nvPr/>
         </p:nvPicPr>
         <p:blipFill>
-          <a:blip r:embed="rId2">
+          <a:blip r:embed="rId7" cstate="print">
             <a:extLst>
               <a:ext uri="{28A0092B-C50C-407E-A947-70E740481C1C}">
                 <a14:useLocalDpi xmlns:a14="http://schemas.microsoft.com/office/drawing/2010/main" val="0"/>
               </a:ext>
             </a:extLst>
           </a:blip>
+          <a:srcRect/>
           <a:stretch>
             <a:fillRect/>
           </a:stretch>
         </p:blipFill>
-        <p:spPr>
-          <a:xfrm>
-            <a:off x="1212366" y="188640"/>
-            <a:ext cx="6719267" cy="5826708"/>
-          </a:xfrm>
-          <a:prstGeom prst="rect">
-            <a:avLst/>
-          </a:prstGeom>
+        <p:spPr bwMode="auto">
+          <a:xfrm>
+            <a:off x="5940152" y="6164162"/>
+            <a:ext cx="720080" cy="459272"/>
+          </a:xfrm>
+          <a:prstGeom prst="rect">
+            <a:avLst/>
+          </a:prstGeom>
+          <a:noFill/>
+          <a:ln>
+            <a:noFill/>
+          </a:ln>
+          <a:extLst>
+            <a:ext uri="{909E8E84-426E-40DD-AFC4-6F175D3DCCD1}">
+              <a14:hiddenFill xmlns:a14="http://schemas.microsoft.com/office/drawing/2010/main">
+                <a:solidFill>
+                  <a:srgbClr val="FFFFFF"/>
+                </a:solidFill>
+              </a14:hiddenFill>
+            </a:ext>
+            <a:ext uri="{91240B29-F687-4F45-9708-019B960494DF}">
+              <a14:hiddenLine xmlns:a14="http://schemas.microsoft.com/office/drawing/2010/main" w="9525">
+                <a:solidFill>
+                  <a:srgbClr val="000000"/>
+                </a:solidFill>
+                <a:miter lim="800000"/>
+                <a:headEnd/>
+                <a:tailEnd/>
+              </a14:hiddenLine>
+            </a:ext>
+          </a:extLst>
         </p:spPr>
       </p:pic>
+      <p:sp>
+        <p:nvSpPr>
+          <p:cNvPr id="4" name="CaixaDeTexto 3"/>
+          <p:cNvSpPr txBox="1"/>
+          <p:nvPr/>
+        </p:nvSpPr>
+        <p:spPr>
+          <a:xfrm>
+            <a:off x="440879" y="1270192"/>
+            <a:ext cx="871008" cy="369332"/>
+          </a:xfrm>
+          <a:prstGeom prst="rect">
+            <a:avLst/>
+          </a:prstGeom>
+          <a:noFill/>
+        </p:spPr>
+        <p:txBody>
+          <a:bodyPr wrap="none" rtlCol="0">
+            <a:spAutoFit/>
+          </a:bodyPr>
+          <a:lstStyle/>
+          <a:p>
+            <a:r>
+              <a:rPr lang="pt-BR" dirty="0" smtClean="0">
+                <a:solidFill>
+                  <a:schemeClr val="bg1">
+                    <a:lumMod val="50000"/>
+                  </a:schemeClr>
+                </a:solidFill>
+              </a:rPr>
+              <a:t>Fontes:</a:t>
+            </a:r>
+            <a:endParaRPr lang="pt-BR" dirty="0">
+              <a:solidFill>
+                <a:schemeClr val="bg1">
+                  <a:lumMod val="50000"/>
+                </a:schemeClr>
+              </a:solidFill>
+            </a:endParaRPr>
+          </a:p>
+        </p:txBody>
+      </p:sp>
     </p:spTree>
     <p:extLst>
       <p:ext uri="{BB962C8B-B14F-4D97-AF65-F5344CB8AC3E}">
-        <p14:creationId xmlns:p14="http://schemas.microsoft.com/office/powerpoint/2010/main" val="668572366"/>
+        <p14:creationId xmlns:p14="http://schemas.microsoft.com/office/powerpoint/2010/main" val="1224790015"/>
       </p:ext>
     </p:extLst>
   </p:cSld>
@@ -4442,75 +4096,11 @@
           <a:chExt cx="0" cy="0"/>
         </a:xfrm>
       </p:grpSpPr>
-      <p:sp>
-        <p:nvSpPr>
-          <p:cNvPr id="2" name="Título 1"/>
-          <p:cNvSpPr>
-            <a:spLocks noGrp="1"/>
-          </p:cNvSpPr>
-          <p:nvPr>
-            <p:ph type="title"/>
-          </p:nvPr>
-        </p:nvSpPr>
-        <p:spPr>
-          <a:xfrm>
-            <a:off x="467446" y="476672"/>
-            <a:ext cx="8229600" cy="4248472"/>
-          </a:xfrm>
-        </p:spPr>
-        <p:txBody>
-          <a:bodyPr>
-            <a:normAutofit/>
-          </a:bodyPr>
-          <a:lstStyle/>
-          <a:p>
-            <a:r>
-              <a:rPr lang="pt-BR" dirty="0"/>
-              <a:t>Quantidade de possíveis usuários:</a:t>
-            </a:r>
-            <a:br>
-              <a:rPr lang="pt-BR" dirty="0"/>
-            </a:br>
-            <a:r>
-              <a:rPr lang="pt-BR" dirty="0"/>
-              <a:t/>
-            </a:r>
-            <a:br>
-              <a:rPr lang="pt-BR" dirty="0"/>
-            </a:br>
-            <a:r>
-              <a:rPr lang="pt-BR" dirty="0"/>
-              <a:t>37.098.282 automóveis</a:t>
-            </a:r>
-            <a:br>
-              <a:rPr lang="pt-BR" dirty="0"/>
-            </a:br>
-            <a:r>
-              <a:rPr lang="pt-BR" dirty="0"/>
-              <a:t>13.121.015 motocicletas</a:t>
-            </a:r>
-            <a:br>
-              <a:rPr lang="pt-BR" dirty="0"/>
-            </a:br>
-            <a:r>
-              <a:rPr lang="pt-BR" dirty="0"/>
-              <a:t>5.333.843 comerciais leves</a:t>
-            </a:r>
-            <a:br>
-              <a:rPr lang="pt-BR" dirty="0"/>
-            </a:br>
-            <a:r>
-              <a:rPr lang="pt-BR" dirty="0"/>
-              <a:t>2.369.566 caminhões</a:t>
-            </a:r>
-          </a:p>
-        </p:txBody>
-      </p:sp>
       <p:pic>
         <p:nvPicPr>
-          <p:cNvPr id="3" name="Picture 5" descr="D:\ATA 2015\Logos 2015\Bebedouro\Logo_Etec branco.png"/>
+          <p:cNvPr id="2" name="Imagem 1"/>
           <p:cNvPicPr>
-            <a:picLocks noChangeAspect="1" noChangeArrowheads="1"/>
+            <a:picLocks noChangeAspect="1"/>
           </p:cNvPicPr>
           <p:nvPr/>
         </p:nvPicPr>
@@ -4522,48 +4112,228 @@
               </a:ext>
             </a:extLst>
           </a:blip>
-          <a:srcRect/>
           <a:stretch>
             <a:fillRect/>
           </a:stretch>
         </p:blipFill>
-        <p:spPr bwMode="auto">
-          <a:xfrm>
-            <a:off x="5940152" y="6164162"/>
-            <a:ext cx="720080" cy="459272"/>
+        <p:spPr>
+          <a:xfrm>
+            <a:off x="6444208" y="116632"/>
+            <a:ext cx="576064" cy="366822"/>
+          </a:xfrm>
+          <a:prstGeom prst="rect">
+            <a:avLst/>
+          </a:prstGeom>
+        </p:spPr>
+      </p:pic>
+      <p:sp>
+        <p:nvSpPr>
+          <p:cNvPr id="3" name="CaixaDeTexto 2">
+            <a:extLst>
+              <a:ext uri="{FF2B5EF4-FFF2-40B4-BE49-F238E27FC236}">
+                <a16:creationId xmlns:a16="http://schemas.microsoft.com/office/drawing/2014/main" id="{01F97DBE-010A-45A5-BF65-B8517B5D0D76}"/>
+              </a:ext>
+            </a:extLst>
+          </p:cNvPr>
+          <p:cNvSpPr txBox="1"/>
+          <p:nvPr/>
+        </p:nvSpPr>
+        <p:spPr>
+          <a:xfrm>
+            <a:off x="7271792" y="5013176"/>
+            <a:ext cx="1872208" cy="1754326"/>
           </a:xfrm>
           <a:prstGeom prst="rect">
             <a:avLst/>
           </a:prstGeom>
           <a:noFill/>
-          <a:ln>
-            <a:noFill/>
-          </a:ln>
-          <a:extLst>
-            <a:ext uri="{909E8E84-426E-40DD-AFC4-6F175D3DCCD1}">
-              <a14:hiddenFill xmlns:a14="http://schemas.microsoft.com/office/drawing/2010/main">
-                <a:solidFill>
-                  <a:srgbClr val="FFFFFF"/>
-                </a:solidFill>
-              </a14:hiddenFill>
-            </a:ext>
-            <a:ext uri="{91240B29-F687-4F45-9708-019B960494DF}">
-              <a14:hiddenLine xmlns:a14="http://schemas.microsoft.com/office/drawing/2010/main" w="9525">
-                <a:solidFill>
-                  <a:srgbClr val="000000"/>
-                </a:solidFill>
-                <a:miter lim="800000"/>
-                <a:headEnd/>
-                <a:tailEnd/>
-              </a14:hiddenLine>
-            </a:ext>
-          </a:extLst>
+        </p:spPr>
+        <p:txBody>
+          <a:bodyPr wrap="square" rtlCol="0">
+            <a:spAutoFit/>
+          </a:bodyPr>
+          <a:lstStyle/>
+          <a:p>
+            <a:r>
+              <a:rPr lang="pt-BR" b="1" dirty="0">
+                <a:solidFill>
+                  <a:srgbClr val="606062"/>
+                </a:solidFill>
+              </a:rPr>
+              <a:t>Grupo:</a:t>
+            </a:r>
+          </a:p>
+          <a:p>
+            <a:r>
+              <a:rPr lang="pt-BR" dirty="0" smtClean="0">
+                <a:solidFill>
+                  <a:srgbClr val="606062"/>
+                </a:solidFill>
+              </a:rPr>
+              <a:t>Caio Rodrigues</a:t>
+            </a:r>
+            <a:endParaRPr lang="pt-BR" dirty="0">
+              <a:solidFill>
+                <a:srgbClr val="606062"/>
+              </a:solidFill>
+            </a:endParaRPr>
+          </a:p>
+          <a:p>
+            <a:r>
+              <a:rPr lang="pt-BR" dirty="0" smtClean="0">
+                <a:solidFill>
+                  <a:srgbClr val="606062"/>
+                </a:solidFill>
+              </a:rPr>
+              <a:t>Junior Zanata</a:t>
+            </a:r>
+            <a:endParaRPr lang="pt-BR" dirty="0">
+              <a:solidFill>
+                <a:srgbClr val="606062"/>
+              </a:solidFill>
+            </a:endParaRPr>
+          </a:p>
+          <a:p>
+            <a:r>
+              <a:rPr lang="pt-BR" dirty="0" smtClean="0">
+                <a:solidFill>
+                  <a:srgbClr val="606062"/>
+                </a:solidFill>
+              </a:rPr>
+              <a:t>Leandro Ferreira</a:t>
+            </a:r>
+            <a:endParaRPr lang="pt-BR" dirty="0">
+              <a:solidFill>
+                <a:srgbClr val="606062"/>
+              </a:solidFill>
+            </a:endParaRPr>
+          </a:p>
+          <a:p>
+            <a:r>
+              <a:rPr lang="pt-BR" dirty="0" smtClean="0">
+                <a:solidFill>
+                  <a:srgbClr val="606062"/>
+                </a:solidFill>
+              </a:rPr>
+              <a:t>Rogério </a:t>
+            </a:r>
+            <a:r>
+              <a:rPr lang="pt-BR" dirty="0" err="1" smtClean="0">
+                <a:solidFill>
+                  <a:srgbClr val="606062"/>
+                </a:solidFill>
+              </a:rPr>
+              <a:t>Takeshi</a:t>
+            </a:r>
+            <a:endParaRPr lang="pt-BR" dirty="0">
+              <a:solidFill>
+                <a:srgbClr val="606062"/>
+              </a:solidFill>
+            </a:endParaRPr>
+          </a:p>
+          <a:p>
+            <a:r>
+              <a:rPr lang="pt-BR" dirty="0" smtClean="0">
+                <a:solidFill>
+                  <a:srgbClr val="606062"/>
+                </a:solidFill>
+              </a:rPr>
+              <a:t>Victor Guedes </a:t>
+            </a:r>
+            <a:endParaRPr lang="pt-BR" dirty="0">
+              <a:solidFill>
+                <a:srgbClr val="606062"/>
+              </a:solidFill>
+            </a:endParaRPr>
+          </a:p>
+        </p:txBody>
+      </p:sp>
+      <p:pic>
+        <p:nvPicPr>
+          <p:cNvPr id="6" name="Imagem 5">
+            <a:extLst>
+              <a:ext uri="{FF2B5EF4-FFF2-40B4-BE49-F238E27FC236}">
+                <a16:creationId xmlns:a16="http://schemas.microsoft.com/office/drawing/2014/main" id="{9CDB29EE-15E9-4BDC-9AF8-F264B4B5914B}"/>
+              </a:ext>
+            </a:extLst>
+          </p:cNvPr>
+          <p:cNvPicPr>
+            <a:picLocks noChangeAspect="1"/>
+          </p:cNvPicPr>
+          <p:nvPr/>
+        </p:nvPicPr>
+        <p:blipFill>
+          <a:blip r:embed="rId3" cstate="print">
+            <a:extLst>
+              <a:ext uri="{28A0092B-C50C-407E-A947-70E740481C1C}">
+                <a14:useLocalDpi xmlns:a14="http://schemas.microsoft.com/office/drawing/2010/main" val="0"/>
+              </a:ext>
+            </a:extLst>
+          </a:blip>
+          <a:stretch>
+            <a:fillRect/>
+          </a:stretch>
+        </p:blipFill>
+        <p:spPr>
+          <a:xfrm>
+            <a:off x="323528" y="1052736"/>
+            <a:ext cx="1296144" cy="1043665"/>
+          </a:xfrm>
+          <a:prstGeom prst="rect">
+            <a:avLst/>
+          </a:prstGeom>
         </p:spPr>
       </p:pic>
+      <p:sp>
+        <p:nvSpPr>
+          <p:cNvPr id="4" name="CaixaDeTexto 3"/>
+          <p:cNvSpPr txBox="1"/>
+          <p:nvPr/>
+        </p:nvSpPr>
+        <p:spPr>
+          <a:xfrm>
+            <a:off x="3131840" y="3140968"/>
+            <a:ext cx="2577950" cy="584775"/>
+          </a:xfrm>
+          <a:prstGeom prst="rect">
+            <a:avLst/>
+          </a:prstGeom>
+          <a:noFill/>
+        </p:spPr>
+        <p:txBody>
+          <a:bodyPr wrap="none" rtlCol="0">
+            <a:spAutoFit/>
+          </a:bodyPr>
+          <a:lstStyle/>
+          <a:p>
+            <a:r>
+              <a:rPr lang="pt-BR" sz="3200" b="1" dirty="0" smtClean="0">
+                <a:solidFill>
+                  <a:schemeClr val="bg1">
+                    <a:lumMod val="50000"/>
+                  </a:schemeClr>
+                </a:solidFill>
+                <a:latin typeface="Arial" panose="020B0604020202020204" pitchFamily="34" charset="0"/>
+                <a:cs typeface="Arial" panose="020B0604020202020204" pitchFamily="34" charset="0"/>
+              </a:rPr>
+              <a:t>OBRIGADO!</a:t>
+            </a:r>
+            <a:endParaRPr lang="pt-BR" sz="3200" b="1" dirty="0">
+              <a:solidFill>
+                <a:schemeClr val="bg1">
+                  <a:lumMod val="50000"/>
+                </a:schemeClr>
+              </a:solidFill>
+              <a:latin typeface="Arial" panose="020B0604020202020204" pitchFamily="34" charset="0"/>
+              <a:cs typeface="Arial" panose="020B0604020202020204" pitchFamily="34" charset="0"/>
+            </a:endParaRPr>
+          </a:p>
+        </p:txBody>
+      </p:sp>
     </p:spTree>
     <p:extLst>
       <p:ext uri="{BB962C8B-B14F-4D97-AF65-F5344CB8AC3E}">
-        <p14:creationId xmlns:p14="http://schemas.microsoft.com/office/powerpoint/2010/main" val="1588188535"/>
+        <p14:creationId xmlns:p14="http://schemas.microsoft.com/office/powerpoint/2010/main" val="1928374318"/>
       </p:ext>
     </p:extLst>
   </p:cSld>

</xml_diff>